<commit_message>
Plan de Gestión de Requerimientos
</commit_message>
<xml_diff>
--- a/Area_de_Proceso-_REQM/PGREQM/PGREQM_V1.0_2015.pptx
+++ b/Area_de_Proceso-_REQM/PGREQM/PGREQM_V1.0_2015.pptx
@@ -4359,7 +4359,7 @@
           <a:p>
             <a:fld id="{56F99C03-A70A-4B29-84B2-81DDC41A991A}" type="datetimeFigureOut">
               <a:rPr lang="es-PE" smtClean="0"/>
-              <a:t>18/10/2015</a:t>
+              <a:t>20/10/2015</a:t>
             </a:fld>
             <a:endParaRPr lang="es-PE"/>
           </a:p>
@@ -5575,7 +5575,7 @@
           <a:p>
             <a:fld id="{216C5678-EE20-4FA5-88E2-6E0BD67A2E26}" type="datetime1">
               <a:rPr lang="en-US" smtClean="0"/>
-              <a:t>10/18/2015</a:t>
+              <a:t>10/20/2015</a:t>
             </a:fld>
             <a:endParaRPr lang="en-US" dirty="0"/>
           </a:p>
@@ -5745,7 +5745,7 @@
           <a:p>
             <a:fld id="{EA051B39-B140-43FE-96DB-472A2B59CE7C}" type="datetime1">
               <a:rPr lang="en-US" smtClean="0"/>
-              <a:t>10/18/2015</a:t>
+              <a:t>10/20/2015</a:t>
             </a:fld>
             <a:endParaRPr lang="en-US"/>
           </a:p>
@@ -5925,7 +5925,7 @@
           <a:p>
             <a:fld id="{DA600BB2-27C5-458B-ABCE-839C88CF47CE}" type="datetime1">
               <a:rPr lang="en-US" smtClean="0"/>
-              <a:t>10/18/2015</a:t>
+              <a:t>10/20/2015</a:t>
             </a:fld>
             <a:endParaRPr lang="en-US"/>
           </a:p>
@@ -6113,7 +6113,7 @@
           <a:p>
             <a:fld id="{B11D738E-8962-435F-8C43-147B8DD7E819}" type="datetime1">
               <a:rPr lang="en-US" smtClean="0"/>
-              <a:t>10/18/2015</a:t>
+              <a:t>10/20/2015</a:t>
             </a:fld>
             <a:endParaRPr lang="en-US"/>
           </a:p>
@@ -6380,7 +6380,7 @@
           <a:p>
             <a:fld id="{09CAEA93-55E7-4DA9-90C2-089A26EEFEC4}" type="datetime1">
               <a:rPr lang="en-US" smtClean="0"/>
-              <a:t>10/18/2015</a:t>
+              <a:t>10/20/2015</a:t>
             </a:fld>
             <a:endParaRPr lang="en-US"/>
           </a:p>
@@ -6733,7 +6733,7 @@
           <a:p>
             <a:fld id="{E34CF3C7-6809-4F39-BD67-A75817BDDE0A}" type="datetime1">
               <a:rPr lang="en-US" smtClean="0"/>
-              <a:t>10/18/2015</a:t>
+              <a:t>10/20/2015</a:t>
             </a:fld>
             <a:endParaRPr lang="en-US"/>
           </a:p>
@@ -7046,7 +7046,7 @@
           <a:p>
             <a:fld id="{F7EAEB24-CE78-465C-A726-91D0868FA48F}" type="datetime1">
               <a:rPr lang="en-US" smtClean="0"/>
-              <a:t>10/18/2015</a:t>
+              <a:t>10/20/2015</a:t>
             </a:fld>
             <a:endParaRPr lang="en-US"/>
           </a:p>
@@ -7278,7 +7278,7 @@
           <a:p>
             <a:fld id="{40BAADF0-1749-4E8B-9691-B44A5F8C0895}" type="datetime1">
               <a:rPr lang="en-US" smtClean="0"/>
-              <a:t>10/18/2015</a:t>
+              <a:t>10/20/2015</a:t>
             </a:fld>
             <a:endParaRPr lang="en-US"/>
           </a:p>
@@ -7373,7 +7373,7 @@
           <a:p>
             <a:fld id="{A8AF628A-A867-4937-BBE5-207DB6F9C51A}" type="datetime1">
               <a:rPr lang="en-US" smtClean="0"/>
-              <a:t>10/18/2015</a:t>
+              <a:t>10/20/2015</a:t>
             </a:fld>
             <a:endParaRPr lang="en-US"/>
           </a:p>
@@ -7666,7 +7666,7 @@
           <a:p>
             <a:fld id="{118BBB94-68E6-4675-A946-F1C5994EDBD7}" type="datetime1">
               <a:rPr lang="en-US" smtClean="0"/>
-              <a:t>10/18/2015</a:t>
+              <a:t>10/20/2015</a:t>
             </a:fld>
             <a:endParaRPr lang="en-US"/>
           </a:p>
@@ -7940,7 +7940,7 @@
           <a:p>
             <a:fld id="{DC3B8377-21E3-4835-B75D-4E2847E2750F}" type="datetime1">
               <a:rPr lang="en-US" smtClean="0"/>
-              <a:t>10/18/2015</a:t>
+              <a:t>10/20/2015</a:t>
             </a:fld>
             <a:endParaRPr lang="en-US"/>
           </a:p>
@@ -8155,7 +8155,7 @@
           <a:p>
             <a:fld id="{B0C4986D-6BE9-4264-908F-02DB36FD8D6C}" type="datetime1">
               <a:rPr lang="en-US" smtClean="0"/>
-              <a:t>10/18/2015</a:t>
+              <a:t>10/20/2015</a:t>
             </a:fld>
             <a:endParaRPr lang="en-US" dirty="0"/>
           </a:p>
@@ -8696,7 +8696,7 @@
           <a:p>
             <a:fld id="{216C5678-EE20-4FA5-88E2-6E0BD67A2E26}" type="datetime1">
               <a:rPr lang="en-US" smtClean="0"/>
-              <a:t>10/18/2015</a:t>
+              <a:t>10/20/2015</a:t>
             </a:fld>
             <a:endParaRPr lang="en-US" dirty="0"/>
           </a:p>
@@ -9206,7 +9206,7 @@
           <a:p>
             <a:fld id="{216C5678-EE20-4FA5-88E2-6E0BD67A2E26}" type="datetime1">
               <a:rPr lang="en-US" smtClean="0"/>
-              <a:t>10/18/2015</a:t>
+              <a:t>10/20/2015</a:t>
             </a:fld>
             <a:endParaRPr lang="en-US" dirty="0"/>
           </a:p>
@@ -9260,7 +9260,6 @@
               <a:rPr lang="en-US" dirty="0"/>
               <a:t>PGREQM_V1.0_2015</a:t>
             </a:r>
-            <a:endParaRPr lang="en-US" dirty="0"/>
           </a:p>
         </p:txBody>
       </p:sp>
@@ -9730,7 +9729,6 @@
               <a:rPr lang="en-US" dirty="0"/>
               <a:t>PGREQM_V1.0_2015</a:t>
             </a:r>
-            <a:endParaRPr lang="en-US" dirty="0"/>
           </a:p>
         </p:txBody>
       </p:sp>
@@ -9756,7 +9754,7 @@
           <a:p>
             <a:fld id="{216C5678-EE20-4FA5-88E2-6E0BD67A2E26}" type="datetime1">
               <a:rPr lang="en-US" smtClean="0"/>
-              <a:t>10/18/2015</a:t>
+              <a:t>10/20/2015</a:t>
             </a:fld>
             <a:endParaRPr lang="en-US" dirty="0"/>
           </a:p>
@@ -9919,7 +9917,7 @@
           <a:p>
             <a:fld id="{216C5678-EE20-4FA5-88E2-6E0BD67A2E26}" type="datetime1">
               <a:rPr lang="en-US" smtClean="0"/>
-              <a:t>10/18/2015</a:t>
+              <a:t>10/20/2015</a:t>
             </a:fld>
             <a:endParaRPr lang="en-US" dirty="0"/>
           </a:p>
@@ -9973,7 +9971,6 @@
               <a:rPr lang="en-US" dirty="0"/>
               <a:t>PGREQM_V1.0_2015</a:t>
             </a:r>
-            <a:endParaRPr lang="en-US" dirty="0"/>
           </a:p>
         </p:txBody>
       </p:sp>
@@ -10171,7 +10168,7 @@
           <a:p>
             <a:fld id="{216C5678-EE20-4FA5-88E2-6E0BD67A2E26}" type="datetime1">
               <a:rPr lang="en-US" smtClean="0"/>
-              <a:t>10/18/2015</a:t>
+              <a:t>10/20/2015</a:t>
             </a:fld>
             <a:endParaRPr lang="en-US" dirty="0"/>
           </a:p>
@@ -10225,7 +10222,6 @@
               <a:rPr lang="en-US" dirty="0"/>
               <a:t>PGREQM_V1.0_2015</a:t>
             </a:r>
-            <a:endParaRPr lang="en-US" dirty="0"/>
           </a:p>
         </p:txBody>
       </p:sp>
@@ -11080,7 +11076,6 @@
               <a:rPr lang="en-US" dirty="0"/>
               <a:t>PGREQM_V1.0_2015</a:t>
             </a:r>
-            <a:endParaRPr lang="en-US" dirty="0"/>
           </a:p>
         </p:txBody>
       </p:sp>
@@ -13990,7 +13985,7 @@
           <p:nvPr>
             <p:extLst>
               <p:ext uri="{D42A27DB-BD31-4B8C-83A1-F6EECF244321}">
-                <p14:modId xmlns:p14="http://schemas.microsoft.com/office/powerpoint/2010/main" val="1060202449"/>
+                <p14:modId xmlns:p14="http://schemas.microsoft.com/office/powerpoint/2010/main" val="2976869849"/>
               </p:ext>
             </p:extLst>
           </p:nvPr>
@@ -14298,35 +14293,6 @@
                     <a:bodyPr/>
                     <a:lstStyle/>
                     <a:p>
-                      <a:pPr marL="0" marR="0" lvl="0" indent="0" algn="l" defTabSz="457200" rtl="0" eaLnBrk="1" fontAlgn="base" latinLnBrk="0" hangingPunct="1">
-                        <a:lnSpc>
-                          <a:spcPct val="100000"/>
-                        </a:lnSpc>
-                        <a:spcBef>
-                          <a:spcPct val="20000"/>
-                        </a:spcBef>
-                        <a:spcAft>
-                          <a:spcPct val="0"/>
-                        </a:spcAft>
-                        <a:buClrTx/>
-                        <a:buSzTx/>
-                        <a:buFontTx/>
-                        <a:buNone/>
-                        <a:tabLst/>
-                      </a:pPr>
-                      <a:r>
-                        <a:rPr lang="es-PE" sz="1200" kern="1200" dirty="0" smtClean="0">
-                          <a:solidFill>
-                            <a:schemeClr val="dk1"/>
-                          </a:solidFill>
-                          <a:latin typeface="+mj-lt"/>
-                          <a:ea typeface="Verdana" panose="020B0604030504040204" pitchFamily="34" charset="0"/>
-                          <a:cs typeface="Verdana" panose="020B0604030504040204" pitchFamily="34" charset="0"/>
-                        </a:rPr>
-                        <a:t>Plantilla: </a:t>
-                      </a:r>
-                    </a:p>
-                    <a:p>
                       <a:pPr marL="171450" marR="0" lvl="0" indent="-171450" algn="l" defTabSz="457200" rtl="0" eaLnBrk="1" fontAlgn="base" latinLnBrk="0" hangingPunct="1">
                         <a:lnSpc>
                           <a:spcPct val="100000"/>
@@ -14352,7 +14318,18 @@
                           <a:ea typeface="Verdana" panose="020B0604030504040204" pitchFamily="34" charset="0"/>
                           <a:cs typeface="Verdana" panose="020B0604030504040204" pitchFamily="34" charset="0"/>
                         </a:rPr>
-                        <a:t>Solicitud de Cambios a Requerimientos</a:t>
+                        <a:t>SOLCREQ Solicitud </a:t>
+                      </a:r>
+                      <a:r>
+                        <a:rPr lang="es-PE" sz="1200" kern="1200" dirty="0" smtClean="0">
+                          <a:solidFill>
+                            <a:schemeClr val="dk1"/>
+                          </a:solidFill>
+                          <a:latin typeface="+mj-lt"/>
+                          <a:ea typeface="Verdana" panose="020B0604030504040204" pitchFamily="34" charset="0"/>
+                          <a:cs typeface="Verdana" panose="020B0604030504040204" pitchFamily="34" charset="0"/>
+                        </a:rPr>
+                        <a:t>de Cambios a Requerimientos</a:t>
                       </a:r>
                     </a:p>
                     <a:p>
@@ -14381,16 +14358,41 @@
                           <a:ea typeface="Verdana" panose="020B0604030504040204" pitchFamily="34" charset="0"/>
                           <a:cs typeface="Verdana" panose="020B0604030504040204" pitchFamily="34" charset="0"/>
                         </a:rPr>
-                        <a:t>Registro de Cambios a Requerimientos.</a:t>
+                        <a:t>RCEQM</a:t>
                       </a:r>
-                      <a:endParaRPr lang="es-ES" sz="1200" kern="1200" dirty="0" smtClean="0">
-                        <a:solidFill>
-                          <a:schemeClr val="dk1"/>
-                        </a:solidFill>
-                        <a:latin typeface="+mj-lt"/>
-                        <a:ea typeface="Verdana" panose="020B0604030504040204" pitchFamily="34" charset="0"/>
-                        <a:cs typeface="Verdana" panose="020B0604030504040204" pitchFamily="34" charset="0"/>
-                      </a:endParaRPr>
+                      <a:r>
+                        <a:rPr lang="es-ES" sz="1200" kern="1200" baseline="0" dirty="0" smtClean="0">
+                          <a:solidFill>
+                            <a:schemeClr val="dk1"/>
+                          </a:solidFill>
+                          <a:latin typeface="+mj-lt"/>
+                          <a:ea typeface="Verdana" panose="020B0604030504040204" pitchFamily="34" charset="0"/>
+                          <a:cs typeface="Verdana" panose="020B0604030504040204" pitchFamily="34" charset="0"/>
+                        </a:rPr>
+                        <a:t> </a:t>
+                      </a:r>
+                      <a:r>
+                        <a:rPr lang="es-ES" sz="1200" kern="1200" dirty="0" smtClean="0">
+                          <a:solidFill>
+                            <a:schemeClr val="dk1"/>
+                          </a:solidFill>
+                          <a:latin typeface="+mj-lt"/>
+                          <a:ea typeface="Verdana" panose="020B0604030504040204" pitchFamily="34" charset="0"/>
+                          <a:cs typeface="Verdana" panose="020B0604030504040204" pitchFamily="34" charset="0"/>
+                        </a:rPr>
+                        <a:t>Registro </a:t>
+                      </a:r>
+                      <a:r>
+                        <a:rPr lang="es-ES" sz="1200" kern="1200" dirty="0" smtClean="0">
+                          <a:solidFill>
+                            <a:schemeClr val="dk1"/>
+                          </a:solidFill>
+                          <a:latin typeface="+mj-lt"/>
+                          <a:ea typeface="Verdana" panose="020B0604030504040204" pitchFamily="34" charset="0"/>
+                          <a:cs typeface="Verdana" panose="020B0604030504040204" pitchFamily="34" charset="0"/>
+                        </a:rPr>
+                        <a:t>de Cambios a Requerimientos.</a:t>
+                      </a:r>
                     </a:p>
                   </a:txBody>
                   <a:tcPr anchor="ctr" horzOverflow="overflow"/>
@@ -14522,29 +14524,7 @@
                           <a:ea typeface="Verdana" panose="020B0604030504040204" pitchFamily="34" charset="0"/>
                           <a:cs typeface="Verdana" panose="020B0604030504040204" pitchFamily="34" charset="0"/>
                         </a:rPr>
-                        <a:t>Estimar </a:t>
-                      </a:r>
-                      <a:r>
-                        <a:rPr lang="es-ES" sz="1200" kern="1200" dirty="0" smtClean="0">
-                          <a:solidFill>
-                            <a:schemeClr val="dk1"/>
-                          </a:solidFill>
-                          <a:latin typeface="+mj-lt"/>
-                          <a:ea typeface="Verdana" panose="020B0604030504040204" pitchFamily="34" charset="0"/>
-                          <a:cs typeface="Verdana" panose="020B0604030504040204" pitchFamily="34" charset="0"/>
-                        </a:rPr>
-                        <a:t>cual es el impacto en los planes de trabajo vigentes por la actividad de evaluación de impacto de un cambio, antes de realizar la </a:t>
-                      </a:r>
-                      <a:r>
-                        <a:rPr lang="es-ES" sz="1200" kern="1200" dirty="0" smtClean="0">
-                          <a:solidFill>
-                            <a:schemeClr val="dk1"/>
-                          </a:solidFill>
-                          <a:latin typeface="+mj-lt"/>
-                          <a:ea typeface="Verdana" panose="020B0604030504040204" pitchFamily="34" charset="0"/>
-                          <a:cs typeface="Verdana" panose="020B0604030504040204" pitchFamily="34" charset="0"/>
-                        </a:rPr>
-                        <a:t>evaluación.</a:t>
+                        <a:t>Estimar cual es el impacto en los planes de trabajo vigentes por la actividad de evaluación de impacto de un cambio, antes de realizar la evaluación.</a:t>
                       </a:r>
                     </a:p>
                     <a:p>
@@ -14573,18 +14553,7 @@
                           <a:ea typeface="Verdana" panose="020B0604030504040204" pitchFamily="34" charset="0"/>
                           <a:cs typeface="Verdana" panose="020B0604030504040204" pitchFamily="34" charset="0"/>
                         </a:rPr>
-                        <a:t>Determinar </a:t>
-                      </a:r>
-                      <a:r>
-                        <a:rPr lang="es-ES" sz="1200" kern="1200" dirty="0" smtClean="0">
-                          <a:solidFill>
-                            <a:schemeClr val="dk1"/>
-                          </a:solidFill>
-                          <a:latin typeface="+mj-lt"/>
-                          <a:ea typeface="Verdana" panose="020B0604030504040204" pitchFamily="34" charset="0"/>
-                          <a:cs typeface="Verdana" panose="020B0604030504040204" pitchFamily="34" charset="0"/>
-                        </a:rPr>
-                        <a:t>las actividades impactadas en los planes de trabajo vigentes y las fechas comprometidas por el estudio de impacto.</a:t>
+                        <a:t>Determinar las actividades impactadas en los planes de trabajo vigentes y las fechas comprometidas por el estudio de impacto.</a:t>
                       </a:r>
                     </a:p>
                   </a:txBody>
@@ -14595,7 +14564,7 @@
                     <a:bodyPr/>
                     <a:lstStyle/>
                     <a:p>
-                      <a:pPr marL="0" marR="0" lvl="0" indent="0" algn="l" defTabSz="457200" rtl="0" eaLnBrk="1" fontAlgn="base" latinLnBrk="0" hangingPunct="1">
+                      <a:pPr marL="171450" marR="0" lvl="0" indent="-171450" algn="l" defTabSz="457200" rtl="0" eaLnBrk="1" fontAlgn="base" latinLnBrk="0" hangingPunct="1">
                         <a:lnSpc>
                           <a:spcPct val="100000"/>
                         </a:lnSpc>
@@ -14608,7 +14577,7 @@
                         <a:buClrTx/>
                         <a:buSzTx/>
                         <a:buFontTx/>
-                        <a:buNone/>
+                        <a:buChar char="-"/>
                         <a:tabLst/>
                       </a:pPr>
                       <a:r>
@@ -14620,7 +14589,18 @@
                           <a:ea typeface="Verdana" panose="020B0604030504040204" pitchFamily="34" charset="0"/>
                           <a:cs typeface="Verdana" panose="020B0604030504040204" pitchFamily="34" charset="0"/>
                         </a:rPr>
-                        <a:t>Plantilla: </a:t>
+                        <a:t>SOLCREQ Solicitud </a:t>
+                      </a:r>
+                      <a:r>
+                        <a:rPr lang="es-PE" sz="1200" kern="1200" dirty="0" smtClean="0">
+                          <a:solidFill>
+                            <a:schemeClr val="dk1"/>
+                          </a:solidFill>
+                          <a:latin typeface="+mj-lt"/>
+                          <a:ea typeface="Verdana" panose="020B0604030504040204" pitchFamily="34" charset="0"/>
+                          <a:cs typeface="Verdana" panose="020B0604030504040204" pitchFamily="34" charset="0"/>
+                        </a:rPr>
+                        <a:t>de Cambios a Requerimientos</a:t>
                       </a:r>
                     </a:p>
                     <a:p>
@@ -14649,58 +14629,7 @@
                           <a:ea typeface="Verdana" panose="020B0604030504040204" pitchFamily="34" charset="0"/>
                           <a:cs typeface="Verdana" panose="020B0604030504040204" pitchFamily="34" charset="0"/>
                         </a:rPr>
-                        <a:t>Solicitud </a:t>
-                      </a:r>
-                      <a:r>
-                        <a:rPr lang="es-PE" sz="1200" kern="1200" dirty="0" smtClean="0">
-                          <a:solidFill>
-                            <a:schemeClr val="dk1"/>
-                          </a:solidFill>
-                          <a:latin typeface="+mj-lt"/>
-                          <a:ea typeface="Verdana" panose="020B0604030504040204" pitchFamily="34" charset="0"/>
-                          <a:cs typeface="Verdana" panose="020B0604030504040204" pitchFamily="34" charset="0"/>
-                        </a:rPr>
-                        <a:t>de Cambios a </a:t>
-                      </a:r>
-                      <a:r>
-                        <a:rPr lang="es-PE" sz="1200" kern="1200" dirty="0" smtClean="0">
-                          <a:solidFill>
-                            <a:schemeClr val="dk1"/>
-                          </a:solidFill>
-                          <a:latin typeface="+mj-lt"/>
-                          <a:ea typeface="Verdana" panose="020B0604030504040204" pitchFamily="34" charset="0"/>
-                          <a:cs typeface="Verdana" panose="020B0604030504040204" pitchFamily="34" charset="0"/>
-                        </a:rPr>
-                        <a:t>Requerimientos</a:t>
-                      </a:r>
-                    </a:p>
-                    <a:p>
-                      <a:pPr marL="171450" marR="0" lvl="0" indent="-171450" algn="l" defTabSz="457200" rtl="0" eaLnBrk="1" fontAlgn="base" latinLnBrk="0" hangingPunct="1">
-                        <a:lnSpc>
-                          <a:spcPct val="100000"/>
-                        </a:lnSpc>
-                        <a:spcBef>
-                          <a:spcPct val="20000"/>
-                        </a:spcBef>
-                        <a:spcAft>
-                          <a:spcPct val="0"/>
-                        </a:spcAft>
-                        <a:buClrTx/>
-                        <a:buSzTx/>
-                        <a:buFontTx/>
-                        <a:buChar char="-"/>
-                        <a:tabLst/>
-                      </a:pPr>
-                      <a:r>
-                        <a:rPr lang="es-PE" sz="1200" kern="1200" dirty="0" smtClean="0">
-                          <a:solidFill>
-                            <a:schemeClr val="dk1"/>
-                          </a:solidFill>
-                          <a:latin typeface="+mj-lt"/>
-                          <a:ea typeface="Verdana" panose="020B0604030504040204" pitchFamily="34" charset="0"/>
-                          <a:cs typeface="Verdana" panose="020B0604030504040204" pitchFamily="34" charset="0"/>
-                        </a:rPr>
-                        <a:t>Lista </a:t>
+                        <a:t>LMREQM Lista </a:t>
                       </a:r>
                       <a:r>
                         <a:rPr lang="es-PE" sz="1200" kern="1200" dirty="0" smtClean="0">
@@ -14873,29 +14802,7 @@
                           <a:ea typeface="Verdana" panose="020B0604030504040204" pitchFamily="34" charset="0"/>
                           <a:cs typeface="Verdana" panose="020B0604030504040204" pitchFamily="34" charset="0"/>
                         </a:rPr>
-                        <a:t>Esta </a:t>
-                      </a:r>
-                      <a:r>
-                        <a:rPr lang="es-ES" sz="1200" kern="1200" dirty="0" smtClean="0">
-                          <a:solidFill>
-                            <a:schemeClr val="dk1"/>
-                          </a:solidFill>
-                          <a:latin typeface="+mj-lt"/>
-                          <a:ea typeface="Verdana" panose="020B0604030504040204" pitchFamily="34" charset="0"/>
-                          <a:cs typeface="Verdana" panose="020B0604030504040204" pitchFamily="34" charset="0"/>
-                        </a:rPr>
-                        <a:t>actividad refleja lo que el canal autorizado decide para aprobar la evaluación del impacto del cambio con respecto a una Solicitud de </a:t>
-                      </a:r>
-                      <a:r>
-                        <a:rPr lang="es-ES" sz="1200" kern="1200" dirty="0" smtClean="0">
-                          <a:solidFill>
-                            <a:schemeClr val="dk1"/>
-                          </a:solidFill>
-                          <a:latin typeface="+mj-lt"/>
-                          <a:ea typeface="Verdana" panose="020B0604030504040204" pitchFamily="34" charset="0"/>
-                          <a:cs typeface="Verdana" panose="020B0604030504040204" pitchFamily="34" charset="0"/>
-                        </a:rPr>
-                        <a:t>Cambio.</a:t>
+                        <a:t>Esta actividad refleja lo que el canal autorizado decide para aprobar la evaluación del impacto del cambio con respecto a una Solicitud de Cambio.</a:t>
                       </a:r>
                     </a:p>
                     <a:p>
@@ -14924,18 +14831,7 @@
                           <a:ea typeface="Verdana" panose="020B0604030504040204" pitchFamily="34" charset="0"/>
                           <a:cs typeface="Verdana" panose="020B0604030504040204" pitchFamily="34" charset="0"/>
                         </a:rPr>
-                        <a:t>Si </a:t>
-                      </a:r>
-                      <a:r>
-                        <a:rPr lang="es-ES" sz="1200" kern="1200" dirty="0" smtClean="0">
-                          <a:solidFill>
-                            <a:schemeClr val="dk1"/>
-                          </a:solidFill>
-                          <a:latin typeface="+mj-lt"/>
-                          <a:ea typeface="Verdana" panose="020B0604030504040204" pitchFamily="34" charset="0"/>
-                          <a:cs typeface="Verdana" panose="020B0604030504040204" pitchFamily="34" charset="0"/>
-                        </a:rPr>
-                        <a:t>se autoriza la evaluación de la solicitud de cambio, se envía la conformidad quedando registrado en acta .</a:t>
+                        <a:t>Si se autoriza la evaluación de la solicitud de cambio, se envía la conformidad quedando registrado en acta .</a:t>
                       </a:r>
                     </a:p>
                   </a:txBody>
@@ -14971,7 +14867,18 @@
                           <a:ea typeface="Verdana" panose="020B0604030504040204" pitchFamily="34" charset="0"/>
                           <a:cs typeface="Verdana" panose="020B0604030504040204" pitchFamily="34" charset="0"/>
                         </a:rPr>
-                        <a:t>Acta de</a:t>
+                        <a:t>ARINT Acta </a:t>
+                      </a:r>
+                      <a:r>
+                        <a:rPr lang="es-ES" sz="1200" kern="1200" dirty="0" smtClean="0">
+                          <a:solidFill>
+                            <a:schemeClr val="dk1"/>
+                          </a:solidFill>
+                          <a:latin typeface="+mj-lt"/>
+                          <a:ea typeface="Verdana" panose="020B0604030504040204" pitchFamily="34" charset="0"/>
+                          <a:cs typeface="Verdana" panose="020B0604030504040204" pitchFamily="34" charset="0"/>
+                        </a:rPr>
+                        <a:t>de</a:t>
                       </a:r>
                       <a:r>
                         <a:rPr lang="es-ES" sz="1200" kern="1200" baseline="0" dirty="0" smtClean="0">
@@ -15025,7 +14932,6 @@
               <a:rPr lang="en-US" dirty="0"/>
               <a:t>PGREQM_V1.0_2015</a:t>
             </a:r>
-            <a:endParaRPr lang="en-US" dirty="0"/>
           </a:p>
         </p:txBody>
       </p:sp>
@@ -15051,7 +14957,7 @@
           <a:p>
             <a:fld id="{216C5678-EE20-4FA5-88E2-6E0BD67A2E26}" type="datetime1">
               <a:rPr lang="en-US" smtClean="0"/>
-              <a:t>10/18/2015</a:t>
+              <a:t>10/20/2015</a:t>
             </a:fld>
             <a:endParaRPr lang="en-US" dirty="0"/>
           </a:p>
@@ -15274,7 +15180,7 @@
           <p:nvPr>
             <p:extLst>
               <p:ext uri="{D42A27DB-BD31-4B8C-83A1-F6EECF244321}">
-                <p14:modId xmlns:p14="http://schemas.microsoft.com/office/powerpoint/2010/main" val="2038654803"/>
+                <p14:modId xmlns:p14="http://schemas.microsoft.com/office/powerpoint/2010/main" val="560943156"/>
               </p:ext>
             </p:extLst>
           </p:nvPr>
@@ -15627,8 +15533,49 @@
                           <a:ea typeface="Verdana" panose="020B0604030504040204" pitchFamily="34" charset="0"/>
                           <a:cs typeface="Verdana" panose="020B0604030504040204" pitchFamily="34" charset="0"/>
                         </a:rPr>
-                        <a:t>Plantilla Matriz de Trazabilidad a Documentos</a:t>
+                        <a:t>MTREQM Matriz </a:t>
                       </a:r>
+                      <a:r>
+                        <a:rPr lang="es-ES" sz="1200" kern="1200" dirty="0" smtClean="0">
+                          <a:solidFill>
+                            <a:schemeClr val="dk1"/>
+                          </a:solidFill>
+                          <a:latin typeface="+mj-lt"/>
+                          <a:ea typeface="Verdana" panose="020B0604030504040204" pitchFamily="34" charset="0"/>
+                          <a:cs typeface="Verdana" panose="020B0604030504040204" pitchFamily="34" charset="0"/>
+                        </a:rPr>
+                        <a:t>de </a:t>
+                      </a:r>
+                      <a:r>
+                        <a:rPr lang="es-ES" sz="1200" kern="1200" dirty="0" smtClean="0">
+                          <a:solidFill>
+                            <a:schemeClr val="dk1"/>
+                          </a:solidFill>
+                          <a:latin typeface="+mj-lt"/>
+                          <a:ea typeface="Verdana" panose="020B0604030504040204" pitchFamily="34" charset="0"/>
+                          <a:cs typeface="Verdana" panose="020B0604030504040204" pitchFamily="34" charset="0"/>
+                        </a:rPr>
+                        <a:t>Trazabilidad de</a:t>
+                      </a:r>
+                      <a:r>
+                        <a:rPr lang="es-ES" sz="1200" kern="1200" baseline="0" dirty="0" smtClean="0">
+                          <a:solidFill>
+                            <a:schemeClr val="dk1"/>
+                          </a:solidFill>
+                          <a:latin typeface="+mj-lt"/>
+                          <a:ea typeface="Verdana" panose="020B0604030504040204" pitchFamily="34" charset="0"/>
+                          <a:cs typeface="Verdana" panose="020B0604030504040204" pitchFamily="34" charset="0"/>
+                        </a:rPr>
+                        <a:t> Requerimientos</a:t>
+                      </a:r>
+                      <a:endParaRPr lang="es-ES" sz="1200" kern="1200" dirty="0" smtClean="0">
+                        <a:solidFill>
+                          <a:schemeClr val="dk1"/>
+                        </a:solidFill>
+                        <a:latin typeface="+mj-lt"/>
+                        <a:ea typeface="Verdana" panose="020B0604030504040204" pitchFamily="34" charset="0"/>
+                        <a:cs typeface="Verdana" panose="020B0604030504040204" pitchFamily="34" charset="0"/>
+                      </a:endParaRPr>
                     </a:p>
                   </a:txBody>
                   <a:tcPr marT="45730" marB="45730" anchor="ctr" horzOverflow="overflow"/>
@@ -15988,7 +15935,7 @@
                           <a:ea typeface="Verdana" panose="020B0604030504040204" pitchFamily="34" charset="0"/>
                           <a:cs typeface="Verdana" panose="020B0604030504040204" pitchFamily="34" charset="0"/>
                         </a:rPr>
-                        <a:t>Acta </a:t>
+                        <a:t>ARINT Acta </a:t>
                       </a:r>
                       <a:r>
                         <a:rPr lang="es-ES" sz="1200" kern="1200" dirty="0" smtClean="0">
@@ -15999,27 +15946,8 @@
                           <a:ea typeface="Verdana" panose="020B0604030504040204" pitchFamily="34" charset="0"/>
                           <a:cs typeface="Verdana" panose="020B0604030504040204" pitchFamily="34" charset="0"/>
                         </a:rPr>
-                        <a:t>de </a:t>
+                        <a:t>de Reunión Interna</a:t>
                       </a:r>
-                      <a:r>
-                        <a:rPr lang="es-ES" sz="1200" kern="1200" dirty="0" smtClean="0">
-                          <a:solidFill>
-                            <a:schemeClr val="dk1"/>
-                          </a:solidFill>
-                          <a:latin typeface="+mj-lt"/>
-                          <a:ea typeface="Verdana" panose="020B0604030504040204" pitchFamily="34" charset="0"/>
-                          <a:cs typeface="Verdana" panose="020B0604030504040204" pitchFamily="34" charset="0"/>
-                        </a:rPr>
-                        <a:t>Reunión Interna</a:t>
-                      </a:r>
-                      <a:endParaRPr lang="es-ES" sz="1200" kern="1200" dirty="0" smtClean="0">
-                        <a:solidFill>
-                          <a:schemeClr val="dk1"/>
-                        </a:solidFill>
-                        <a:latin typeface="+mj-lt"/>
-                        <a:ea typeface="Verdana" panose="020B0604030504040204" pitchFamily="34" charset="0"/>
-                        <a:cs typeface="Verdana" panose="020B0604030504040204" pitchFamily="34" charset="0"/>
-                      </a:endParaRPr>
                     </a:p>
                   </a:txBody>
                   <a:tcPr marT="45730" marB="45730" anchor="ctr" horzOverflow="overflow"/>
@@ -16053,7 +15981,6 @@
               <a:rPr lang="en-US" dirty="0"/>
               <a:t>PGREQM_V1.0_2015</a:t>
             </a:r>
-            <a:endParaRPr lang="en-US" dirty="0"/>
           </a:p>
         </p:txBody>
       </p:sp>
@@ -16079,7 +16006,7 @@
           <a:p>
             <a:fld id="{216C5678-EE20-4FA5-88E2-6E0BD67A2E26}" type="datetime1">
               <a:rPr lang="en-US" smtClean="0"/>
-              <a:t>10/18/2015</a:t>
+              <a:t>10/20/2015</a:t>
             </a:fld>
             <a:endParaRPr lang="en-US" dirty="0"/>
           </a:p>
@@ -16389,7 +16316,7 @@
           <a:p>
             <a:fld id="{216C5678-EE20-4FA5-88E2-6E0BD67A2E26}" type="datetime1">
               <a:rPr lang="en-US" smtClean="0"/>
-              <a:t>10/18/2015</a:t>
+              <a:t>10/20/2015</a:t>
             </a:fld>
             <a:endParaRPr lang="en-US" dirty="0"/>
           </a:p>
@@ -16443,7 +16370,6 @@
               <a:rPr lang="en-US" dirty="0"/>
               <a:t>PGREQM_V1.0_2015</a:t>
             </a:r>
-            <a:endParaRPr lang="en-US" dirty="0"/>
           </a:p>
         </p:txBody>
       </p:sp>
@@ -16643,7 +16569,6 @@
               <a:rPr lang="en-US" dirty="0"/>
               <a:t>PGREQM_V1.0_2015</a:t>
             </a:r>
-            <a:endParaRPr lang="en-US" dirty="0"/>
           </a:p>
         </p:txBody>
       </p:sp>
@@ -16669,7 +16594,7 @@
           <a:p>
             <a:fld id="{216C5678-EE20-4FA5-88E2-6E0BD67A2E26}" type="datetime1">
               <a:rPr lang="en-US" smtClean="0"/>
-              <a:t>10/18/2015</a:t>
+              <a:t>10/20/2015</a:t>
             </a:fld>
             <a:endParaRPr lang="en-US" dirty="0"/>
           </a:p>
@@ -16719,19 +16644,7 @@
                   </a:outerShdw>
                 </a:effectLst>
               </a:rPr>
-              <a:t>- Volatilidad </a:t>
-            </a:r>
-            <a:r>
-              <a:rPr lang="es-ES" b="1" dirty="0" smtClean="0">
-                <a:effectLst>
-                  <a:outerShdw blurRad="38100" dist="38100" dir="2700000" algn="tl">
-                    <a:srgbClr val="000000">
-                      <a:alpha val="43137"/>
-                    </a:srgbClr>
-                  </a:outerShdw>
-                </a:effectLst>
-              </a:rPr>
-              <a:t>de requerimientos</a:t>
+              <a:t>- Volatilidad de requerimientos</a:t>
             </a:r>
             <a:endParaRPr lang="es-PE" b="1" dirty="0">
               <a:effectLst>
@@ -16902,7 +16815,7 @@
           <a:p>
             <a:fld id="{216C5678-EE20-4FA5-88E2-6E0BD67A2E26}" type="datetime1">
               <a:rPr lang="en-US" smtClean="0"/>
-              <a:t>10/18/2015</a:t>
+              <a:t>10/20/2015</a:t>
             </a:fld>
             <a:endParaRPr lang="en-US" dirty="0"/>
           </a:p>
@@ -16956,7 +16869,6 @@
               <a:rPr lang="en-US" dirty="0"/>
               <a:t>PGREQM_V1.0_2015</a:t>
             </a:r>
-            <a:endParaRPr lang="en-US" dirty="0"/>
           </a:p>
         </p:txBody>
       </p:sp>
@@ -17110,7 +17022,6 @@
               <a:rPr lang="en-US" dirty="0"/>
               <a:t>PGREQM_V1.0_2015</a:t>
             </a:r>
-            <a:endParaRPr lang="en-US" dirty="0"/>
           </a:p>
         </p:txBody>
       </p:sp>
@@ -17136,7 +17047,7 @@
           <a:p>
             <a:fld id="{216C5678-EE20-4FA5-88E2-6E0BD67A2E26}" type="datetime1">
               <a:rPr lang="en-US" smtClean="0"/>
-              <a:t>10/18/2015</a:t>
+              <a:t>10/20/2015</a:t>
             </a:fld>
             <a:endParaRPr lang="en-US" dirty="0"/>
           </a:p>
@@ -17264,7 +17175,6 @@
               <a:rPr lang="en-US" dirty="0"/>
               <a:t>PGREQM_V1.0_2015</a:t>
             </a:r>
-            <a:endParaRPr lang="en-US" dirty="0"/>
           </a:p>
         </p:txBody>
       </p:sp>
@@ -19539,7 +19449,7 @@
           <a:p>
             <a:fld id="{216C5678-EE20-4FA5-88E2-6E0BD67A2E26}" type="datetime1">
               <a:rPr lang="en-US" smtClean="0"/>
-              <a:t>10/18/2015</a:t>
+              <a:t>10/20/2015</a:t>
             </a:fld>
             <a:endParaRPr lang="en-US" dirty="0"/>
           </a:p>
@@ -19593,7 +19503,6 @@
               <a:rPr lang="en-US" dirty="0"/>
               <a:t>PGREQM_V1.0_2015</a:t>
             </a:r>
-            <a:endParaRPr lang="en-US" dirty="0"/>
           </a:p>
         </p:txBody>
       </p:sp>
@@ -20144,29 +20053,7 @@
                           <a:ea typeface="Verdana" panose="020B0604030504040204" pitchFamily="34" charset="0"/>
                           <a:cs typeface="Verdana" panose="020B0604030504040204" pitchFamily="34" charset="0"/>
                         </a:rPr>
-                        <a:t>Roger </a:t>
-                      </a:r>
-                      <a:r>
-                        <a:rPr lang="es-ES" sz="1200" b="1" kern="1200" dirty="0" err="1" smtClean="0">
-                          <a:solidFill>
-                            <a:schemeClr val="dk1"/>
-                          </a:solidFill>
-                          <a:latin typeface="+mj-lt"/>
-                          <a:ea typeface="Verdana" panose="020B0604030504040204" pitchFamily="34" charset="0"/>
-                          <a:cs typeface="Verdana" panose="020B0604030504040204" pitchFamily="34" charset="0"/>
-                        </a:rPr>
-                        <a:t>Apaestegui</a:t>
-                      </a:r>
-                      <a:r>
-                        <a:rPr lang="es-ES" sz="1200" b="1" kern="1200" dirty="0" smtClean="0">
-                          <a:solidFill>
-                            <a:schemeClr val="dk1"/>
-                          </a:solidFill>
-                          <a:latin typeface="+mj-lt"/>
-                          <a:ea typeface="Verdana" panose="020B0604030504040204" pitchFamily="34" charset="0"/>
-                          <a:cs typeface="Verdana" panose="020B0604030504040204" pitchFamily="34" charset="0"/>
-                        </a:rPr>
-                        <a:t> Ortega</a:t>
+                        <a:t>Roger Apaestegui Ortega</a:t>
                       </a:r>
                     </a:p>
                     <a:p>
@@ -21245,7 +21132,6 @@
               <a:rPr lang="en-US" dirty="0"/>
               <a:t>PGREQM_V1.0_2015</a:t>
             </a:r>
-            <a:endParaRPr lang="en-US" dirty="0"/>
           </a:p>
         </p:txBody>
       </p:sp>
@@ -21698,7 +21584,7 @@
             <a:fld id="{216C5678-EE20-4FA5-88E2-6E0BD67A2E26}" type="datetime1">
               <a:rPr lang="en-US" smtClean="0"/>
               <a:pPr/>
-              <a:t>10/18/2015</a:t>
+              <a:t>10/20/2015</a:t>
             </a:fld>
             <a:endParaRPr lang="en-US" dirty="0"/>
           </a:p>
@@ -21728,7 +21614,6 @@
               <a:rPr lang="en-US" dirty="0"/>
               <a:t>PGREQM_V1.0_2015</a:t>
             </a:r>
-            <a:endParaRPr lang="en-US" dirty="0"/>
           </a:p>
         </p:txBody>
       </p:sp>
@@ -21859,7 +21744,7 @@
           <a:p>
             <a:fld id="{216C5678-EE20-4FA5-88E2-6E0BD67A2E26}" type="datetime1">
               <a:rPr lang="en-US" smtClean="0"/>
-              <a:t>10/18/2015</a:t>
+              <a:t>10/20/2015</a:t>
             </a:fld>
             <a:endParaRPr lang="en-US" dirty="0"/>
           </a:p>
@@ -21913,7 +21798,6 @@
               <a:rPr lang="en-US" dirty="0"/>
               <a:t>PGREQM_V1.0_2015</a:t>
             </a:r>
-            <a:endParaRPr lang="en-US" dirty="0"/>
           </a:p>
         </p:txBody>
       </p:sp>
@@ -22225,7 +22109,7 @@
           <a:p>
             <a:fld id="{216C5678-EE20-4FA5-88E2-6E0BD67A2E26}" type="datetime1">
               <a:rPr lang="en-US" smtClean="0"/>
-              <a:t>10/18/2015</a:t>
+              <a:t>10/20/2015</a:t>
             </a:fld>
             <a:endParaRPr lang="en-US" dirty="0"/>
           </a:p>
@@ -22255,7 +22139,6 @@
               <a:rPr lang="en-US" dirty="0"/>
               <a:t>PGREQM_V1.0_2015</a:t>
             </a:r>
-            <a:endParaRPr lang="en-US" dirty="0"/>
           </a:p>
         </p:txBody>
       </p:sp>
@@ -22416,7 +22299,7 @@
           <a:p>
             <a:fld id="{216C5678-EE20-4FA5-88E2-6E0BD67A2E26}" type="datetime1">
               <a:rPr lang="en-US" smtClean="0"/>
-              <a:t>10/18/2015</a:t>
+              <a:t>10/20/2015</a:t>
             </a:fld>
             <a:endParaRPr lang="en-US" dirty="0"/>
           </a:p>
@@ -22470,7 +22353,6 @@
               <a:rPr lang="en-US" dirty="0"/>
               <a:t>PGREQM_V1.0_2015</a:t>
             </a:r>
-            <a:endParaRPr lang="en-US" dirty="0"/>
           </a:p>
         </p:txBody>
       </p:sp>
@@ -23121,7 +23003,6 @@
               <a:rPr lang="en-US" dirty="0"/>
               <a:t>PGREQM_V1.0_2015</a:t>
             </a:r>
-            <a:endParaRPr lang="en-US" dirty="0"/>
           </a:p>
         </p:txBody>
       </p:sp>
@@ -23147,7 +23028,7 @@
           <a:p>
             <a:fld id="{216C5678-EE20-4FA5-88E2-6E0BD67A2E26}" type="datetime1">
               <a:rPr lang="en-US" smtClean="0"/>
-              <a:t>10/18/2015</a:t>
+              <a:t>10/20/2015</a:t>
             </a:fld>
             <a:endParaRPr lang="en-US" dirty="0"/>
           </a:p>
@@ -23310,7 +23191,7 @@
           <a:p>
             <a:fld id="{216C5678-EE20-4FA5-88E2-6E0BD67A2E26}" type="datetime1">
               <a:rPr lang="en-US" smtClean="0"/>
-              <a:t>10/18/2015</a:t>
+              <a:t>10/20/2015</a:t>
             </a:fld>
             <a:endParaRPr lang="en-US" dirty="0"/>
           </a:p>
@@ -23364,7 +23245,6 @@
               <a:rPr lang="en-US" dirty="0"/>
               <a:t>PGREQM_V1.0_2015</a:t>
             </a:r>
-            <a:endParaRPr lang="en-US" dirty="0"/>
           </a:p>
         </p:txBody>
       </p:sp>
@@ -23512,7 +23392,6 @@
               <a:rPr lang="en-US" dirty="0"/>
               <a:t>PGREQM_V1.0_2015</a:t>
             </a:r>
-            <a:endParaRPr lang="en-US" dirty="0"/>
           </a:p>
         </p:txBody>
       </p:sp>
@@ -23538,7 +23417,7 @@
           <a:p>
             <a:fld id="{216C5678-EE20-4FA5-88E2-6E0BD67A2E26}" type="datetime1">
               <a:rPr lang="en-US" smtClean="0"/>
-              <a:t>10/18/2015</a:t>
+              <a:t>10/20/2015</a:t>
             </a:fld>
             <a:endParaRPr lang="en-US" dirty="0"/>
           </a:p>

</xml_diff>

<commit_message>
Proceso de Gestión de Requerimientos
</commit_message>
<xml_diff>
--- a/Area_de_Proceso-_REQM/PGREQM/PGREQM_V1.0_2015.pptx
+++ b/Area_de_Proceso-_REQM/PGREQM/PGREQM_V1.0_2015.pptx
@@ -1973,1039 +1973,6 @@
       <dsp:cNvGrpSpPr/>
     </dsp:nvGrpSpPr>
     <dsp:grpSpPr/>
-    <dsp:sp modelId="{55A4A5BB-6FD8-475A-835C-B4EB380A1BDF}">
-      <dsp:nvSpPr>
-        <dsp:cNvPr id="0" name=""/>
-        <dsp:cNvSpPr/>
-      </dsp:nvSpPr>
-      <dsp:spPr>
-        <a:xfrm rot="5400000">
-          <a:off x="4673027" y="-3125572"/>
-          <a:ext cx="768123" cy="7167375"/>
-        </a:xfrm>
-        <a:prstGeom prst="round2SameRect">
-          <a:avLst/>
-        </a:prstGeom>
-        <a:solidFill>
-          <a:schemeClr val="dk2">
-            <a:alpha val="90000"/>
-            <a:tint val="40000"/>
-            <a:hueOff val="0"/>
-            <a:satOff val="0"/>
-            <a:lumOff val="0"/>
-            <a:alphaOff val="0"/>
-          </a:schemeClr>
-        </a:solidFill>
-        <a:ln w="28575" cap="flat" cmpd="sng" algn="ctr">
-          <a:solidFill>
-            <a:schemeClr val="dk2">
-              <a:alpha val="90000"/>
-              <a:tint val="40000"/>
-              <a:hueOff val="0"/>
-              <a:satOff val="0"/>
-              <a:lumOff val="0"/>
-              <a:alphaOff val="0"/>
-            </a:schemeClr>
-          </a:solidFill>
-          <a:prstDash val="solid"/>
-        </a:ln>
-        <a:effectLst/>
-      </dsp:spPr>
-      <dsp:style>
-        <a:lnRef idx="2">
-          <a:scrgbClr r="0" g="0" b="0"/>
-        </a:lnRef>
-        <a:fillRef idx="1">
-          <a:scrgbClr r="0" g="0" b="0"/>
-        </a:fillRef>
-        <a:effectRef idx="0">
-          <a:scrgbClr r="0" g="0" b="0"/>
-        </a:effectRef>
-        <a:fontRef idx="minor"/>
-      </dsp:style>
-      <dsp:txBody>
-        <a:bodyPr spcFirstLastPara="0" vert="horz" wrap="square" lIns="247650" tIns="123825" rIns="247650" bIns="123825" numCol="1" spcCol="1270" anchor="ctr" anchorCtr="0">
-          <a:noAutofit/>
-        </a:bodyPr>
-        <a:lstStyle/>
-        <a:p>
-          <a:pPr marL="114300" lvl="1" indent="-114300" algn="just" defTabSz="577850">
-            <a:lnSpc>
-              <a:spcPct val="90000"/>
-            </a:lnSpc>
-            <a:spcBef>
-              <a:spcPct val="0"/>
-            </a:spcBef>
-            <a:spcAft>
-              <a:spcPct val="15000"/>
-            </a:spcAft>
-            <a:buChar char="••"/>
-          </a:pPr>
-          <a:r>
-            <a:rPr lang="es-PE" altLang="es-PE" sz="1300" kern="1200" dirty="0" smtClean="0">
-              <a:solidFill>
-                <a:schemeClr val="tx1"/>
-              </a:solidFill>
-              <a:latin typeface="+mj-lt"/>
-            </a:rPr>
-            <a:t>Solicita cambios a los requerimientos acordados.</a:t>
-          </a:r>
-          <a:endParaRPr lang="es-PE" sz="1300" kern="1200" dirty="0">
-            <a:solidFill>
-              <a:schemeClr val="tx1"/>
-            </a:solidFill>
-            <a:latin typeface="+mj-lt"/>
-          </a:endParaRPr>
-        </a:p>
-        <a:p>
-          <a:pPr marL="114300" lvl="1" indent="-114300" algn="l" defTabSz="577850">
-            <a:lnSpc>
-              <a:spcPct val="90000"/>
-            </a:lnSpc>
-            <a:spcBef>
-              <a:spcPct val="0"/>
-            </a:spcBef>
-            <a:spcAft>
-              <a:spcPct val="15000"/>
-            </a:spcAft>
-            <a:buChar char="••"/>
-          </a:pPr>
-          <a:r>
-            <a:rPr lang="es-PE" altLang="es-PE" sz="1300" kern="1200" dirty="0" smtClean="0">
-              <a:solidFill>
-                <a:schemeClr val="tx1"/>
-              </a:solidFill>
-              <a:latin typeface="+mj-lt"/>
-            </a:rPr>
-            <a:t>Solicita nuevos requerimientos.</a:t>
-          </a:r>
-        </a:p>
-        <a:p>
-          <a:pPr marL="114300" lvl="1" indent="-114300" algn="l" defTabSz="577850">
-            <a:lnSpc>
-              <a:spcPct val="90000"/>
-            </a:lnSpc>
-            <a:spcBef>
-              <a:spcPct val="0"/>
-            </a:spcBef>
-            <a:spcAft>
-              <a:spcPct val="15000"/>
-            </a:spcAft>
-            <a:buChar char="••"/>
-          </a:pPr>
-          <a:r>
-            <a:rPr lang="es-PE" altLang="es-PE" sz="1300" kern="1200" dirty="0" smtClean="0">
-              <a:solidFill>
-                <a:schemeClr val="tx1"/>
-              </a:solidFill>
-              <a:latin typeface="+mj-lt"/>
-            </a:rPr>
-            <a:t>Resuelve consultas acerca de los cambios solicitados en los requerimientos.</a:t>
-          </a:r>
-        </a:p>
-      </dsp:txBody>
-      <dsp:txXfrm rot="-5400000">
-        <a:off x="1473402" y="111550"/>
-        <a:ext cx="7129878" cy="693129"/>
-      </dsp:txXfrm>
-    </dsp:sp>
-    <dsp:sp modelId="{8CC325B9-FE1B-4789-9E50-400E884AD525}">
-      <dsp:nvSpPr>
-        <dsp:cNvPr id="0" name=""/>
-        <dsp:cNvSpPr/>
-      </dsp:nvSpPr>
-      <dsp:spPr>
-        <a:xfrm>
-          <a:off x="182" y="116"/>
-          <a:ext cx="1473218" cy="915997"/>
-        </a:xfrm>
-        <a:prstGeom prst="roundRect">
-          <a:avLst/>
-        </a:prstGeom>
-        <a:solidFill>
-          <a:schemeClr val="dk2">
-            <a:hueOff val="0"/>
-            <a:satOff val="0"/>
-            <a:lumOff val="0"/>
-            <a:alphaOff val="0"/>
-          </a:schemeClr>
-        </a:solidFill>
-        <a:ln w="28575" cap="flat" cmpd="sng" algn="ctr">
-          <a:solidFill>
-            <a:schemeClr val="lt2">
-              <a:hueOff val="0"/>
-              <a:satOff val="0"/>
-              <a:lumOff val="0"/>
-              <a:alphaOff val="0"/>
-            </a:schemeClr>
-          </a:solidFill>
-          <a:prstDash val="solid"/>
-        </a:ln>
-        <a:effectLst/>
-      </dsp:spPr>
-      <dsp:style>
-        <a:lnRef idx="2">
-          <a:scrgbClr r="0" g="0" b="0"/>
-        </a:lnRef>
-        <a:fillRef idx="1">
-          <a:scrgbClr r="0" g="0" b="0"/>
-        </a:fillRef>
-        <a:effectRef idx="0">
-          <a:scrgbClr r="0" g="0" b="0"/>
-        </a:effectRef>
-        <a:fontRef idx="minor">
-          <a:schemeClr val="lt1"/>
-        </a:fontRef>
-      </dsp:style>
-      <dsp:txBody>
-        <a:bodyPr spcFirstLastPara="0" vert="horz" wrap="square" lIns="60960" tIns="30480" rIns="60960" bIns="30480" numCol="1" spcCol="1270" anchor="ctr" anchorCtr="0">
-          <a:noAutofit/>
-        </a:bodyPr>
-        <a:lstStyle/>
-        <a:p>
-          <a:pPr lvl="0" algn="ctr" defTabSz="711200">
-            <a:lnSpc>
-              <a:spcPct val="90000"/>
-            </a:lnSpc>
-            <a:spcBef>
-              <a:spcPct val="0"/>
-            </a:spcBef>
-            <a:spcAft>
-              <a:spcPct val="35000"/>
-            </a:spcAft>
-          </a:pPr>
-          <a:r>
-            <a:rPr lang="es-ES" sz="1600" b="1" kern="1200" dirty="0" smtClean="0">
-              <a:effectLst>
-                <a:outerShdw blurRad="38100" dist="38100" dir="2700000" algn="tl">
-                  <a:srgbClr val="000000">
-                    <a:alpha val="43137"/>
-                  </a:srgbClr>
-                </a:outerShdw>
-              </a:effectLst>
-            </a:rPr>
-            <a:t>MST E.I.R.L</a:t>
-          </a:r>
-        </a:p>
-        <a:p>
-          <a:pPr lvl="0" algn="ctr" defTabSz="711200">
-            <a:lnSpc>
-              <a:spcPct val="90000"/>
-            </a:lnSpc>
-            <a:spcBef>
-              <a:spcPct val="0"/>
-            </a:spcBef>
-            <a:spcAft>
-              <a:spcPct val="35000"/>
-            </a:spcAft>
-          </a:pPr>
-          <a:r>
-            <a:rPr lang="es-ES" sz="1600" b="1" kern="1200" dirty="0" smtClean="0">
-              <a:effectLst>
-                <a:outerShdw blurRad="38100" dist="38100" dir="2700000" algn="tl">
-                  <a:srgbClr val="000000">
-                    <a:alpha val="43137"/>
-                  </a:srgbClr>
-                </a:outerShdw>
-              </a:effectLst>
-            </a:rPr>
-            <a:t>“Cliente”</a:t>
-          </a:r>
-          <a:endParaRPr lang="es-PE" sz="1600" b="1" kern="1200" dirty="0">
-            <a:effectLst>
-              <a:outerShdw blurRad="38100" dist="38100" dir="2700000" algn="tl">
-                <a:srgbClr val="000000">
-                  <a:alpha val="43137"/>
-                </a:srgbClr>
-              </a:outerShdw>
-            </a:effectLst>
-          </a:endParaRPr>
-        </a:p>
-      </dsp:txBody>
-      <dsp:txXfrm>
-        <a:off x="44897" y="44831"/>
-        <a:ext cx="1383788" cy="826567"/>
-      </dsp:txXfrm>
-    </dsp:sp>
-    <dsp:sp modelId="{90FF61B1-8C9B-462F-B4E1-EA95A07D6F86}">
-      <dsp:nvSpPr>
-        <dsp:cNvPr id="0" name=""/>
-        <dsp:cNvSpPr/>
-      </dsp:nvSpPr>
-      <dsp:spPr>
-        <a:xfrm rot="5400000">
-          <a:off x="4630839" y="-2037479"/>
-          <a:ext cx="844142" cy="7163038"/>
-        </a:xfrm>
-        <a:prstGeom prst="round2SameRect">
-          <a:avLst/>
-        </a:prstGeom>
-        <a:solidFill>
-          <a:schemeClr val="dk2">
-            <a:alpha val="90000"/>
-            <a:tint val="40000"/>
-            <a:hueOff val="0"/>
-            <a:satOff val="0"/>
-            <a:lumOff val="0"/>
-            <a:alphaOff val="0"/>
-          </a:schemeClr>
-        </a:solidFill>
-        <a:ln w="28575" cap="flat" cmpd="sng" algn="ctr">
-          <a:solidFill>
-            <a:schemeClr val="dk2">
-              <a:alpha val="90000"/>
-              <a:tint val="40000"/>
-              <a:hueOff val="0"/>
-              <a:satOff val="0"/>
-              <a:lumOff val="0"/>
-              <a:alphaOff val="0"/>
-            </a:schemeClr>
-          </a:solidFill>
-          <a:prstDash val="solid"/>
-        </a:ln>
-        <a:effectLst/>
-      </dsp:spPr>
-      <dsp:style>
-        <a:lnRef idx="2">
-          <a:scrgbClr r="0" g="0" b="0"/>
-        </a:lnRef>
-        <a:fillRef idx="1">
-          <a:scrgbClr r="0" g="0" b="0"/>
-        </a:fillRef>
-        <a:effectRef idx="0">
-          <a:scrgbClr r="0" g="0" b="0"/>
-        </a:effectRef>
-        <a:fontRef idx="minor"/>
-      </dsp:style>
-      <dsp:txBody>
-        <a:bodyPr spcFirstLastPara="0" vert="horz" wrap="square" lIns="247650" tIns="123825" rIns="247650" bIns="123825" numCol="1" spcCol="1270" anchor="ctr" anchorCtr="0">
-          <a:noAutofit/>
-        </a:bodyPr>
-        <a:lstStyle/>
-        <a:p>
-          <a:pPr marL="0" lvl="1" indent="0" algn="just" defTabSz="533400">
-            <a:lnSpc>
-              <a:spcPct val="90000"/>
-            </a:lnSpc>
-            <a:spcBef>
-              <a:spcPct val="0"/>
-            </a:spcBef>
-            <a:spcAft>
-              <a:spcPct val="15000"/>
-            </a:spcAft>
-            <a:buChar char="••"/>
-          </a:pPr>
-          <a:r>
-            <a:rPr lang="es-PE" sz="1200" kern="1200" dirty="0" smtClean="0">
-              <a:solidFill>
-                <a:schemeClr val="tx1"/>
-              </a:solidFill>
-              <a:latin typeface="+mj-lt"/>
-            </a:rPr>
-            <a:t>Autoriza la presentación de una solicitud de cambio.</a:t>
-          </a:r>
-          <a:endParaRPr lang="es-PE" sz="1200" kern="1200" dirty="0">
-            <a:solidFill>
-              <a:schemeClr val="tx1"/>
-            </a:solidFill>
-            <a:latin typeface="+mj-lt"/>
-          </a:endParaRPr>
-        </a:p>
-        <a:p>
-          <a:pPr marL="114300" lvl="1" indent="-114300" algn="l" defTabSz="533400">
-            <a:lnSpc>
-              <a:spcPct val="90000"/>
-            </a:lnSpc>
-            <a:spcBef>
-              <a:spcPct val="0"/>
-            </a:spcBef>
-            <a:spcAft>
-              <a:spcPct val="15000"/>
-            </a:spcAft>
-            <a:buChar char="••"/>
-          </a:pPr>
-          <a:r>
-            <a:rPr lang="es-PE" sz="1200" kern="1200" dirty="0" smtClean="0">
-              <a:solidFill>
-                <a:schemeClr val="tx1"/>
-              </a:solidFill>
-              <a:latin typeface="+mj-lt"/>
-            </a:rPr>
-            <a:t>Autoriza la solicitud de un cambio.</a:t>
-          </a:r>
-        </a:p>
-        <a:p>
-          <a:pPr marL="114300" lvl="1" indent="-114300" algn="l" defTabSz="533400">
-            <a:lnSpc>
-              <a:spcPct val="90000"/>
-            </a:lnSpc>
-            <a:spcBef>
-              <a:spcPct val="0"/>
-            </a:spcBef>
-            <a:spcAft>
-              <a:spcPct val="15000"/>
-            </a:spcAft>
-            <a:buChar char="••"/>
-          </a:pPr>
-          <a:r>
-            <a:rPr lang="es-PE" sz="1200" kern="1200" dirty="0" smtClean="0">
-              <a:solidFill>
-                <a:schemeClr val="tx1"/>
-              </a:solidFill>
-              <a:latin typeface="+mj-lt"/>
-            </a:rPr>
-            <a:t>Define la organización para gestionar los requerimientos del Proyecto</a:t>
-          </a:r>
-        </a:p>
-      </dsp:txBody>
-      <dsp:txXfrm rot="-5400000">
-        <a:off x="1471391" y="1163177"/>
-        <a:ext cx="7121830" cy="761726"/>
-      </dsp:txXfrm>
-    </dsp:sp>
-    <dsp:sp modelId="{26EEAA25-729A-4075-87DC-0DA13F9B7FA1}">
-      <dsp:nvSpPr>
-        <dsp:cNvPr id="0" name=""/>
-        <dsp:cNvSpPr/>
-      </dsp:nvSpPr>
-      <dsp:spPr>
-        <a:xfrm>
-          <a:off x="182" y="1039940"/>
-          <a:ext cx="1471209" cy="1008198"/>
-        </a:xfrm>
-        <a:prstGeom prst="roundRect">
-          <a:avLst/>
-        </a:prstGeom>
-        <a:solidFill>
-          <a:schemeClr val="dk2">
-            <a:hueOff val="0"/>
-            <a:satOff val="0"/>
-            <a:lumOff val="0"/>
-            <a:alphaOff val="0"/>
-          </a:schemeClr>
-        </a:solidFill>
-        <a:ln w="28575" cap="flat" cmpd="sng" algn="ctr">
-          <a:solidFill>
-            <a:schemeClr val="lt2">
-              <a:hueOff val="0"/>
-              <a:satOff val="0"/>
-              <a:lumOff val="0"/>
-              <a:alphaOff val="0"/>
-            </a:schemeClr>
-          </a:solidFill>
-          <a:prstDash val="solid"/>
-        </a:ln>
-        <a:effectLst/>
-      </dsp:spPr>
-      <dsp:style>
-        <a:lnRef idx="2">
-          <a:scrgbClr r="0" g="0" b="0"/>
-        </a:lnRef>
-        <a:fillRef idx="1">
-          <a:scrgbClr r="0" g="0" b="0"/>
-        </a:fillRef>
-        <a:effectRef idx="0">
-          <a:scrgbClr r="0" g="0" b="0"/>
-        </a:effectRef>
-        <a:fontRef idx="minor">
-          <a:schemeClr val="lt1"/>
-        </a:fontRef>
-      </dsp:style>
-      <dsp:txBody>
-        <a:bodyPr spcFirstLastPara="0" vert="horz" wrap="square" lIns="60960" tIns="30480" rIns="60960" bIns="30480" numCol="1" spcCol="1270" anchor="ctr" anchorCtr="0">
-          <a:noAutofit/>
-        </a:bodyPr>
-        <a:lstStyle/>
-        <a:p>
-          <a:pPr lvl="0" algn="ctr" defTabSz="711200">
-            <a:lnSpc>
-              <a:spcPct val="90000"/>
-            </a:lnSpc>
-            <a:spcBef>
-              <a:spcPct val="0"/>
-            </a:spcBef>
-            <a:spcAft>
-              <a:spcPct val="35000"/>
-            </a:spcAft>
-          </a:pPr>
-          <a:r>
-            <a:rPr lang="es-ES" sz="1600" b="1" kern="1200" dirty="0" smtClean="0">
-              <a:effectLst>
-                <a:outerShdw blurRad="38100" dist="38100" dir="2700000" algn="tl">
-                  <a:srgbClr val="000000">
-                    <a:alpha val="43137"/>
-                  </a:srgbClr>
-                </a:outerShdw>
-              </a:effectLst>
-            </a:rPr>
-            <a:t>EJR-SOFT</a:t>
-          </a:r>
-        </a:p>
-        <a:p>
-          <a:pPr lvl="0" algn="ctr" defTabSz="711200">
-            <a:lnSpc>
-              <a:spcPct val="90000"/>
-            </a:lnSpc>
-            <a:spcBef>
-              <a:spcPct val="0"/>
-            </a:spcBef>
-            <a:spcAft>
-              <a:spcPct val="35000"/>
-            </a:spcAft>
-          </a:pPr>
-          <a:r>
-            <a:rPr lang="es-ES" sz="1600" b="1" kern="1200" dirty="0" smtClean="0">
-              <a:effectLst>
-                <a:outerShdw blurRad="38100" dist="38100" dir="2700000" algn="tl">
-                  <a:srgbClr val="000000">
-                    <a:alpha val="43137"/>
-                  </a:srgbClr>
-                </a:outerShdw>
-              </a:effectLst>
-            </a:rPr>
-            <a:t>Jefe de Proyecto</a:t>
-          </a:r>
-          <a:endParaRPr lang="es-PE" sz="1600" b="1" kern="1200" dirty="0">
-            <a:effectLst>
-              <a:outerShdw blurRad="38100" dist="38100" dir="2700000" algn="tl">
-                <a:srgbClr val="000000">
-                  <a:alpha val="43137"/>
-                </a:srgbClr>
-              </a:outerShdw>
-            </a:effectLst>
-          </a:endParaRPr>
-        </a:p>
-      </dsp:txBody>
-      <dsp:txXfrm>
-        <a:off x="49398" y="1089156"/>
-        <a:ext cx="1372777" cy="909766"/>
-      </dsp:txXfrm>
-    </dsp:sp>
-    <dsp:sp modelId="{606E3E56-5C5B-4E6D-B3B5-731FAFDC0CDE}">
-      <dsp:nvSpPr>
-        <dsp:cNvPr id="0" name=""/>
-        <dsp:cNvSpPr/>
-      </dsp:nvSpPr>
-      <dsp:spPr>
-        <a:xfrm rot="5400000">
-          <a:off x="3803274" y="-80928"/>
-          <a:ext cx="2501581" cy="7165343"/>
-        </a:xfrm>
-        <a:prstGeom prst="round2SameRect">
-          <a:avLst/>
-        </a:prstGeom>
-        <a:solidFill>
-          <a:schemeClr val="dk2">
-            <a:alpha val="90000"/>
-            <a:tint val="40000"/>
-            <a:hueOff val="0"/>
-            <a:satOff val="0"/>
-            <a:lumOff val="0"/>
-            <a:alphaOff val="0"/>
-          </a:schemeClr>
-        </a:solidFill>
-        <a:ln w="28575" cap="flat" cmpd="sng" algn="ctr">
-          <a:solidFill>
-            <a:schemeClr val="dk2">
-              <a:alpha val="90000"/>
-              <a:tint val="40000"/>
-              <a:hueOff val="0"/>
-              <a:satOff val="0"/>
-              <a:lumOff val="0"/>
-              <a:alphaOff val="0"/>
-            </a:schemeClr>
-          </a:solidFill>
-          <a:prstDash val="solid"/>
-        </a:ln>
-        <a:effectLst/>
-      </dsp:spPr>
-      <dsp:style>
-        <a:lnRef idx="2">
-          <a:scrgbClr r="0" g="0" b="0"/>
-        </a:lnRef>
-        <a:fillRef idx="1">
-          <a:scrgbClr r="0" g="0" b="0"/>
-        </a:fillRef>
-        <a:effectRef idx="0">
-          <a:scrgbClr r="0" g="0" b="0"/>
-        </a:effectRef>
-        <a:fontRef idx="minor"/>
-      </dsp:style>
-      <dsp:txBody>
-        <a:bodyPr spcFirstLastPara="0" vert="horz" wrap="square" lIns="247650" tIns="123825" rIns="247650" bIns="123825" numCol="1" spcCol="1270" anchor="ctr" anchorCtr="0">
-          <a:noAutofit/>
-        </a:bodyPr>
-        <a:lstStyle/>
-        <a:p>
-          <a:pPr marL="114300" lvl="1" indent="-114300" algn="l" defTabSz="577850">
-            <a:lnSpc>
-              <a:spcPct val="90000"/>
-            </a:lnSpc>
-            <a:spcBef>
-              <a:spcPct val="0"/>
-            </a:spcBef>
-            <a:spcAft>
-              <a:spcPct val="15000"/>
-            </a:spcAft>
-            <a:buChar char="••"/>
-          </a:pPr>
-          <a:r>
-            <a:rPr lang="es-PE" sz="1300" kern="1200" dirty="0" smtClean="0">
-              <a:solidFill>
-                <a:schemeClr val="tx1"/>
-              </a:solidFill>
-              <a:latin typeface="+mj-lt"/>
-            </a:rPr>
-            <a:t>Identifica los requerimientos de usuario.</a:t>
-          </a:r>
-          <a:endParaRPr lang="es-PE" sz="1300" kern="1200" dirty="0">
-            <a:solidFill>
-              <a:schemeClr val="tx1"/>
-            </a:solidFill>
-            <a:latin typeface="+mj-lt"/>
-          </a:endParaRPr>
-        </a:p>
-        <a:p>
-          <a:pPr marL="114300" lvl="1" indent="-114300" algn="l" defTabSz="577850">
-            <a:lnSpc>
-              <a:spcPct val="90000"/>
-            </a:lnSpc>
-            <a:spcBef>
-              <a:spcPct val="0"/>
-            </a:spcBef>
-            <a:spcAft>
-              <a:spcPct val="15000"/>
-            </a:spcAft>
-            <a:buChar char="••"/>
-          </a:pPr>
-          <a:r>
-            <a:rPr lang="es-PE" sz="1300" kern="1200" dirty="0" smtClean="0">
-              <a:solidFill>
-                <a:schemeClr val="tx1"/>
-              </a:solidFill>
-              <a:latin typeface="+mj-lt"/>
-            </a:rPr>
-            <a:t>Tipifica los requerimientos según la “Plantilla de Lista Maestra de Requerimientos para el Proyecto.</a:t>
-          </a:r>
-        </a:p>
-        <a:p>
-          <a:pPr marL="114300" lvl="1" indent="-114300" algn="l" defTabSz="577850">
-            <a:lnSpc>
-              <a:spcPct val="90000"/>
-            </a:lnSpc>
-            <a:spcBef>
-              <a:spcPct val="0"/>
-            </a:spcBef>
-            <a:spcAft>
-              <a:spcPct val="15000"/>
-            </a:spcAft>
-            <a:buChar char="••"/>
-          </a:pPr>
-          <a:r>
-            <a:rPr lang="es-PE" sz="1300" kern="1200" dirty="0" smtClean="0">
-              <a:solidFill>
-                <a:schemeClr val="tx1"/>
-              </a:solidFill>
-              <a:latin typeface="+mj-lt"/>
-            </a:rPr>
-            <a:t>Expone los requerimientos definidos con la finalidad de obtener aprobación del Proveedor de requerimientos.</a:t>
-          </a:r>
-        </a:p>
-        <a:p>
-          <a:pPr marL="114300" lvl="1" indent="-114300" algn="l" defTabSz="577850">
-            <a:lnSpc>
-              <a:spcPct val="90000"/>
-            </a:lnSpc>
-            <a:spcBef>
-              <a:spcPct val="0"/>
-            </a:spcBef>
-            <a:spcAft>
-              <a:spcPct val="15000"/>
-            </a:spcAft>
-            <a:buChar char="••"/>
-          </a:pPr>
-          <a:r>
-            <a:rPr lang="es-PE" sz="1300" kern="1200" dirty="0" smtClean="0">
-              <a:solidFill>
-                <a:schemeClr val="tx1"/>
-              </a:solidFill>
-              <a:latin typeface="+mj-lt"/>
-            </a:rPr>
-            <a:t>Registra y aplica las observaciones que se realicen a los requerimientos en proceso de aprobación.</a:t>
-          </a:r>
-        </a:p>
-        <a:p>
-          <a:pPr marL="114300" lvl="1" indent="-114300" algn="l" defTabSz="577850">
-            <a:lnSpc>
-              <a:spcPct val="90000"/>
-            </a:lnSpc>
-            <a:spcBef>
-              <a:spcPct val="0"/>
-            </a:spcBef>
-            <a:spcAft>
-              <a:spcPct val="15000"/>
-            </a:spcAft>
-            <a:buChar char="••"/>
-          </a:pPr>
-          <a:r>
-            <a:rPr lang="es-PE" sz="1300" kern="1200" dirty="0" smtClean="0">
-              <a:solidFill>
-                <a:schemeClr val="tx1"/>
-              </a:solidFill>
-              <a:latin typeface="+mj-lt"/>
-            </a:rPr>
-            <a:t>Prepara y presenta los requerimientos para autorización formal.</a:t>
-          </a:r>
-        </a:p>
-        <a:p>
-          <a:pPr marL="114300" lvl="1" indent="-114300" algn="l" defTabSz="577850">
-            <a:lnSpc>
-              <a:spcPct val="90000"/>
-            </a:lnSpc>
-            <a:spcBef>
-              <a:spcPct val="0"/>
-            </a:spcBef>
-            <a:spcAft>
-              <a:spcPct val="15000"/>
-            </a:spcAft>
-            <a:buChar char="••"/>
-          </a:pPr>
-          <a:r>
-            <a:rPr lang="es-PE" sz="1300" kern="1200" dirty="0" smtClean="0">
-              <a:solidFill>
-                <a:schemeClr val="tx1"/>
-              </a:solidFill>
-              <a:latin typeface="+mj-lt"/>
-            </a:rPr>
-            <a:t>Es responsable de la evaluación del impacto de un cambio en los requerimientos, indicando qué actividades del cronograma se verán afectadas por el cambio.</a:t>
-          </a:r>
-        </a:p>
-      </dsp:txBody>
-      <dsp:txXfrm rot="-5400000">
-        <a:off x="1471394" y="2373069"/>
-        <a:ext cx="7043226" cy="2257347"/>
-      </dsp:txXfrm>
-    </dsp:sp>
-    <dsp:sp modelId="{4F1584CA-B33D-4DB0-9C34-1ECED7CFA1C5}">
-      <dsp:nvSpPr>
-        <dsp:cNvPr id="0" name=""/>
-        <dsp:cNvSpPr/>
-      </dsp:nvSpPr>
-      <dsp:spPr>
-        <a:xfrm>
-          <a:off x="182" y="2171966"/>
-          <a:ext cx="1471210" cy="2659554"/>
-        </a:xfrm>
-        <a:prstGeom prst="roundRect">
-          <a:avLst/>
-        </a:prstGeom>
-        <a:solidFill>
-          <a:schemeClr val="dk2">
-            <a:hueOff val="0"/>
-            <a:satOff val="0"/>
-            <a:lumOff val="0"/>
-            <a:alphaOff val="0"/>
-          </a:schemeClr>
-        </a:solidFill>
-        <a:ln w="28575" cap="flat" cmpd="sng" algn="ctr">
-          <a:solidFill>
-            <a:schemeClr val="lt2">
-              <a:hueOff val="0"/>
-              <a:satOff val="0"/>
-              <a:lumOff val="0"/>
-              <a:alphaOff val="0"/>
-            </a:schemeClr>
-          </a:solidFill>
-          <a:prstDash val="solid"/>
-        </a:ln>
-        <a:effectLst/>
-      </dsp:spPr>
-      <dsp:style>
-        <a:lnRef idx="2">
-          <a:scrgbClr r="0" g="0" b="0"/>
-        </a:lnRef>
-        <a:fillRef idx="1">
-          <a:scrgbClr r="0" g="0" b="0"/>
-        </a:fillRef>
-        <a:effectRef idx="0">
-          <a:scrgbClr r="0" g="0" b="0"/>
-        </a:effectRef>
-        <a:fontRef idx="minor">
-          <a:schemeClr val="lt1"/>
-        </a:fontRef>
-      </dsp:style>
-      <dsp:txBody>
-        <a:bodyPr spcFirstLastPara="0" vert="horz" wrap="square" lIns="60960" tIns="30480" rIns="60960" bIns="30480" numCol="1" spcCol="1270" anchor="ctr" anchorCtr="0">
-          <a:noAutofit/>
-        </a:bodyPr>
-        <a:lstStyle/>
-        <a:p>
-          <a:pPr lvl="0" algn="ctr" defTabSz="711200">
-            <a:lnSpc>
-              <a:spcPct val="90000"/>
-            </a:lnSpc>
-            <a:spcBef>
-              <a:spcPct val="0"/>
-            </a:spcBef>
-            <a:spcAft>
-              <a:spcPct val="35000"/>
-            </a:spcAft>
-          </a:pPr>
-          <a:r>
-            <a:rPr lang="es-ES" sz="1600" b="1" kern="1200" dirty="0" smtClean="0">
-              <a:effectLst>
-                <a:outerShdw blurRad="38100" dist="38100" dir="2700000" algn="tl">
-                  <a:srgbClr val="000000">
-                    <a:alpha val="43137"/>
-                  </a:srgbClr>
-                </a:outerShdw>
-              </a:effectLst>
-            </a:rPr>
-            <a:t>Analista Funcional</a:t>
-          </a:r>
-        </a:p>
-        <a:p>
-          <a:pPr lvl="0" algn="ctr" defTabSz="711200">
-            <a:lnSpc>
-              <a:spcPct val="90000"/>
-            </a:lnSpc>
-            <a:spcBef>
-              <a:spcPct val="0"/>
-            </a:spcBef>
-            <a:spcAft>
-              <a:spcPct val="35000"/>
-            </a:spcAft>
-          </a:pPr>
-          <a:r>
-            <a:rPr lang="es-ES" sz="1600" b="1" kern="1200" dirty="0" smtClean="0">
-              <a:effectLst>
-                <a:outerShdw blurRad="38100" dist="38100" dir="2700000" algn="tl">
-                  <a:srgbClr val="000000">
-                    <a:alpha val="43137"/>
-                  </a:srgbClr>
-                </a:outerShdw>
-              </a:effectLst>
-            </a:rPr>
-            <a:t>EJR-SOFT</a:t>
-          </a:r>
-          <a:endParaRPr lang="es-PE" sz="1600" b="1" kern="1200" dirty="0">
-            <a:effectLst>
-              <a:outerShdw blurRad="38100" dist="38100" dir="2700000" algn="tl">
-                <a:srgbClr val="000000">
-                  <a:alpha val="43137"/>
-                </a:srgbClr>
-              </a:outerShdw>
-            </a:effectLst>
-          </a:endParaRPr>
-        </a:p>
-      </dsp:txBody>
-      <dsp:txXfrm>
-        <a:off x="72001" y="2243785"/>
-        <a:ext cx="1327572" cy="2515916"/>
-      </dsp:txXfrm>
-    </dsp:sp>
-    <dsp:sp modelId="{50E57063-BAFE-4849-B27F-45AB6336F242}">
-      <dsp:nvSpPr>
-        <dsp:cNvPr id="0" name=""/>
-        <dsp:cNvSpPr/>
-      </dsp:nvSpPr>
-      <dsp:spPr>
-        <a:xfrm rot="5400000">
-          <a:off x="4604393" y="1908744"/>
-          <a:ext cx="897794" cy="7161436"/>
-        </a:xfrm>
-        <a:prstGeom prst="round2SameRect">
-          <a:avLst/>
-        </a:prstGeom>
-        <a:solidFill>
-          <a:schemeClr val="dk2">
-            <a:alpha val="90000"/>
-            <a:tint val="40000"/>
-            <a:hueOff val="0"/>
-            <a:satOff val="0"/>
-            <a:lumOff val="0"/>
-            <a:alphaOff val="0"/>
-          </a:schemeClr>
-        </a:solidFill>
-        <a:ln w="28575" cap="flat" cmpd="sng" algn="ctr">
-          <a:solidFill>
-            <a:schemeClr val="dk2">
-              <a:alpha val="90000"/>
-              <a:tint val="40000"/>
-              <a:hueOff val="0"/>
-              <a:satOff val="0"/>
-              <a:lumOff val="0"/>
-              <a:alphaOff val="0"/>
-            </a:schemeClr>
-          </a:solidFill>
-          <a:prstDash val="solid"/>
-        </a:ln>
-        <a:effectLst/>
-      </dsp:spPr>
-      <dsp:style>
-        <a:lnRef idx="2">
-          <a:scrgbClr r="0" g="0" b="0"/>
-        </a:lnRef>
-        <a:fillRef idx="1">
-          <a:scrgbClr r="0" g="0" b="0"/>
-        </a:fillRef>
-        <a:effectRef idx="0">
-          <a:scrgbClr r="0" g="0" b="0"/>
-        </a:effectRef>
-        <a:fontRef idx="minor"/>
-      </dsp:style>
-      <dsp:txBody>
-        <a:bodyPr spcFirstLastPara="0" vert="horz" wrap="square" lIns="247650" tIns="123825" rIns="247650" bIns="123825" numCol="1" spcCol="1270" anchor="ctr" anchorCtr="0">
-          <a:noAutofit/>
-        </a:bodyPr>
-        <a:lstStyle/>
-        <a:p>
-          <a:pPr marL="114300" lvl="1" indent="-114300" algn="l" defTabSz="577850">
-            <a:lnSpc>
-              <a:spcPct val="90000"/>
-            </a:lnSpc>
-            <a:spcBef>
-              <a:spcPct val="0"/>
-            </a:spcBef>
-            <a:spcAft>
-              <a:spcPct val="15000"/>
-            </a:spcAft>
-            <a:buChar char="••"/>
-          </a:pPr>
-          <a:r>
-            <a:rPr lang="es-PE" sz="1300" kern="1200" dirty="0" smtClean="0">
-              <a:latin typeface="+mj-lt"/>
-            </a:rPr>
-            <a:t>Participa en la evaluación del impacto de cambios a requerimientos, indicando qué actividades del cronograma se verán afectadas por el cambio</a:t>
-          </a:r>
-          <a:endParaRPr lang="es-PE" sz="1300" kern="1200" dirty="0">
-            <a:latin typeface="+mj-lt"/>
-          </a:endParaRPr>
-        </a:p>
-      </dsp:txBody>
-      <dsp:txXfrm rot="-5400000">
-        <a:off x="1472573" y="5084392"/>
-        <a:ext cx="7117609" cy="810140"/>
-      </dsp:txXfrm>
-    </dsp:sp>
-    <dsp:sp modelId="{0C172A3D-1747-485F-A12F-621E60BDAD9E}">
-      <dsp:nvSpPr>
-        <dsp:cNvPr id="0" name=""/>
-        <dsp:cNvSpPr/>
-      </dsp:nvSpPr>
-      <dsp:spPr>
-        <a:xfrm>
-          <a:off x="182" y="4955347"/>
-          <a:ext cx="1472389" cy="1068230"/>
-        </a:xfrm>
-        <a:prstGeom prst="roundRect">
-          <a:avLst/>
-        </a:prstGeom>
-        <a:solidFill>
-          <a:schemeClr val="dk2">
-            <a:hueOff val="0"/>
-            <a:satOff val="0"/>
-            <a:lumOff val="0"/>
-            <a:alphaOff val="0"/>
-          </a:schemeClr>
-        </a:solidFill>
-        <a:ln w="28575" cap="flat" cmpd="sng" algn="ctr">
-          <a:solidFill>
-            <a:schemeClr val="lt2">
-              <a:hueOff val="0"/>
-              <a:satOff val="0"/>
-              <a:lumOff val="0"/>
-              <a:alphaOff val="0"/>
-            </a:schemeClr>
-          </a:solidFill>
-          <a:prstDash val="solid"/>
-        </a:ln>
-        <a:effectLst/>
-      </dsp:spPr>
-      <dsp:style>
-        <a:lnRef idx="2">
-          <a:scrgbClr r="0" g="0" b="0"/>
-        </a:lnRef>
-        <a:fillRef idx="1">
-          <a:scrgbClr r="0" g="0" b="0"/>
-        </a:fillRef>
-        <a:effectRef idx="0">
-          <a:scrgbClr r="0" g="0" b="0"/>
-        </a:effectRef>
-        <a:fontRef idx="minor">
-          <a:schemeClr val="lt1"/>
-        </a:fontRef>
-      </dsp:style>
-      <dsp:txBody>
-        <a:bodyPr spcFirstLastPara="0" vert="horz" wrap="square" lIns="60960" tIns="30480" rIns="60960" bIns="30480" numCol="1" spcCol="1270" anchor="ctr" anchorCtr="0">
-          <a:noAutofit/>
-        </a:bodyPr>
-        <a:lstStyle/>
-        <a:p>
-          <a:pPr lvl="0" algn="ctr" defTabSz="711200">
-            <a:lnSpc>
-              <a:spcPct val="90000"/>
-            </a:lnSpc>
-            <a:spcBef>
-              <a:spcPct val="0"/>
-            </a:spcBef>
-            <a:spcAft>
-              <a:spcPct val="35000"/>
-            </a:spcAft>
-          </a:pPr>
-          <a:r>
-            <a:rPr lang="es-ES" sz="1600" b="1" kern="1200" dirty="0" smtClean="0">
-              <a:effectLst>
-                <a:outerShdw blurRad="38100" dist="38100" dir="2700000" algn="tl">
-                  <a:srgbClr val="000000">
-                    <a:alpha val="43137"/>
-                  </a:srgbClr>
-                </a:outerShdw>
-              </a:effectLst>
-            </a:rPr>
-            <a:t>Analista de Calidad</a:t>
-          </a:r>
-        </a:p>
-        <a:p>
-          <a:pPr lvl="0" algn="ctr" defTabSz="711200">
-            <a:lnSpc>
-              <a:spcPct val="90000"/>
-            </a:lnSpc>
-            <a:spcBef>
-              <a:spcPct val="0"/>
-            </a:spcBef>
-            <a:spcAft>
-              <a:spcPct val="35000"/>
-            </a:spcAft>
-          </a:pPr>
-          <a:r>
-            <a:rPr lang="es-ES" sz="1600" b="1" kern="1200" dirty="0" smtClean="0">
-              <a:effectLst>
-                <a:outerShdw blurRad="38100" dist="38100" dir="2700000" algn="tl">
-                  <a:srgbClr val="000000">
-                    <a:alpha val="43137"/>
-                  </a:srgbClr>
-                </a:outerShdw>
-              </a:effectLst>
-            </a:rPr>
-            <a:t>EJR-SOFT</a:t>
-          </a:r>
-          <a:endParaRPr lang="es-PE" sz="1600" b="1" kern="1200" dirty="0">
-            <a:effectLst>
-              <a:outerShdw blurRad="38100" dist="38100" dir="2700000" algn="tl">
-                <a:srgbClr val="000000">
-                  <a:alpha val="43137"/>
-                </a:srgbClr>
-              </a:outerShdw>
-            </a:effectLst>
-          </a:endParaRPr>
-        </a:p>
-      </dsp:txBody>
-      <dsp:txXfrm>
-        <a:off x="52329" y="5007494"/>
-        <a:ext cx="1368095" cy="963936"/>
-      </dsp:txXfrm>
-    </dsp:sp>
   </dsp:spTree>
 </dsp:drawing>
 </file>
@@ -14318,18 +13285,7 @@
                           <a:ea typeface="Verdana" panose="020B0604030504040204" pitchFamily="34" charset="0"/>
                           <a:cs typeface="Verdana" panose="020B0604030504040204" pitchFamily="34" charset="0"/>
                         </a:rPr>
-                        <a:t>SOLCREQ Solicitud </a:t>
-                      </a:r>
-                      <a:r>
-                        <a:rPr lang="es-PE" sz="1200" kern="1200" dirty="0" smtClean="0">
-                          <a:solidFill>
-                            <a:schemeClr val="dk1"/>
-                          </a:solidFill>
-                          <a:latin typeface="+mj-lt"/>
-                          <a:ea typeface="Verdana" panose="020B0604030504040204" pitchFamily="34" charset="0"/>
-                          <a:cs typeface="Verdana" panose="020B0604030504040204" pitchFamily="34" charset="0"/>
-                        </a:rPr>
-                        <a:t>de Cambios a Requerimientos</a:t>
+                        <a:t>SOLCREQ Solicitud de Cambios a Requerimientos</a:t>
                       </a:r>
                     </a:p>
                     <a:p>
@@ -14380,18 +13336,7 @@
                           <a:ea typeface="Verdana" panose="020B0604030504040204" pitchFamily="34" charset="0"/>
                           <a:cs typeface="Verdana" panose="020B0604030504040204" pitchFamily="34" charset="0"/>
                         </a:rPr>
-                        <a:t>Registro </a:t>
-                      </a:r>
-                      <a:r>
-                        <a:rPr lang="es-ES" sz="1200" kern="1200" dirty="0" smtClean="0">
-                          <a:solidFill>
-                            <a:schemeClr val="dk1"/>
-                          </a:solidFill>
-                          <a:latin typeface="+mj-lt"/>
-                          <a:ea typeface="Verdana" panose="020B0604030504040204" pitchFamily="34" charset="0"/>
-                          <a:cs typeface="Verdana" panose="020B0604030504040204" pitchFamily="34" charset="0"/>
-                        </a:rPr>
-                        <a:t>de Cambios a Requerimientos.</a:t>
+                        <a:t>Registro de Cambios a Requerimientos.</a:t>
                       </a:r>
                     </a:p>
                   </a:txBody>
@@ -14589,18 +13534,7 @@
                           <a:ea typeface="Verdana" panose="020B0604030504040204" pitchFamily="34" charset="0"/>
                           <a:cs typeface="Verdana" panose="020B0604030504040204" pitchFamily="34" charset="0"/>
                         </a:rPr>
-                        <a:t>SOLCREQ Solicitud </a:t>
-                      </a:r>
-                      <a:r>
-                        <a:rPr lang="es-PE" sz="1200" kern="1200" dirty="0" smtClean="0">
-                          <a:solidFill>
-                            <a:schemeClr val="dk1"/>
-                          </a:solidFill>
-                          <a:latin typeface="+mj-lt"/>
-                          <a:ea typeface="Verdana" panose="020B0604030504040204" pitchFamily="34" charset="0"/>
-                          <a:cs typeface="Verdana" panose="020B0604030504040204" pitchFamily="34" charset="0"/>
-                        </a:rPr>
-                        <a:t>de Cambios a Requerimientos</a:t>
+                        <a:t>SOLCREQ Solicitud de Cambios a Requerimientos</a:t>
                       </a:r>
                     </a:p>
                     <a:p>
@@ -14629,18 +13563,7 @@
                           <a:ea typeface="Verdana" panose="020B0604030504040204" pitchFamily="34" charset="0"/>
                           <a:cs typeface="Verdana" panose="020B0604030504040204" pitchFamily="34" charset="0"/>
                         </a:rPr>
-                        <a:t>LMREQM Lista </a:t>
-                      </a:r>
-                      <a:r>
-                        <a:rPr lang="es-PE" sz="1200" kern="1200" dirty="0" smtClean="0">
-                          <a:solidFill>
-                            <a:schemeClr val="dk1"/>
-                          </a:solidFill>
-                          <a:latin typeface="+mj-lt"/>
-                          <a:ea typeface="Verdana" panose="020B0604030504040204" pitchFamily="34" charset="0"/>
-                          <a:cs typeface="Verdana" panose="020B0604030504040204" pitchFamily="34" charset="0"/>
-                        </a:rPr>
-                        <a:t>maestra de requerimientos</a:t>
+                        <a:t>LMREQM Lista maestra de requerimientos</a:t>
                       </a:r>
                       <a:endParaRPr lang="es-ES" sz="1200" kern="1200" dirty="0" smtClean="0">
                         <a:solidFill>
@@ -14867,18 +13790,7 @@
                           <a:ea typeface="Verdana" panose="020B0604030504040204" pitchFamily="34" charset="0"/>
                           <a:cs typeface="Verdana" panose="020B0604030504040204" pitchFamily="34" charset="0"/>
                         </a:rPr>
-                        <a:t>ARINT Acta </a:t>
-                      </a:r>
-                      <a:r>
-                        <a:rPr lang="es-ES" sz="1200" kern="1200" dirty="0" smtClean="0">
-                          <a:solidFill>
-                            <a:schemeClr val="dk1"/>
-                          </a:solidFill>
-                          <a:latin typeface="+mj-lt"/>
-                          <a:ea typeface="Verdana" panose="020B0604030504040204" pitchFamily="34" charset="0"/>
-                          <a:cs typeface="Verdana" panose="020B0604030504040204" pitchFamily="34" charset="0"/>
-                        </a:rPr>
-                        <a:t>de</a:t>
+                        <a:t>ARINT Acta de</a:t>
                       </a:r>
                       <a:r>
                         <a:rPr lang="es-ES" sz="1200" kern="1200" baseline="0" dirty="0" smtClean="0">
@@ -15533,29 +14445,7 @@
                           <a:ea typeface="Verdana" panose="020B0604030504040204" pitchFamily="34" charset="0"/>
                           <a:cs typeface="Verdana" panose="020B0604030504040204" pitchFamily="34" charset="0"/>
                         </a:rPr>
-                        <a:t>MTREQM Matriz </a:t>
-                      </a:r>
-                      <a:r>
-                        <a:rPr lang="es-ES" sz="1200" kern="1200" dirty="0" smtClean="0">
-                          <a:solidFill>
-                            <a:schemeClr val="dk1"/>
-                          </a:solidFill>
-                          <a:latin typeface="+mj-lt"/>
-                          <a:ea typeface="Verdana" panose="020B0604030504040204" pitchFamily="34" charset="0"/>
-                          <a:cs typeface="Verdana" panose="020B0604030504040204" pitchFamily="34" charset="0"/>
-                        </a:rPr>
-                        <a:t>de </a:t>
-                      </a:r>
-                      <a:r>
-                        <a:rPr lang="es-ES" sz="1200" kern="1200" dirty="0" smtClean="0">
-                          <a:solidFill>
-                            <a:schemeClr val="dk1"/>
-                          </a:solidFill>
-                          <a:latin typeface="+mj-lt"/>
-                          <a:ea typeface="Verdana" panose="020B0604030504040204" pitchFamily="34" charset="0"/>
-                          <a:cs typeface="Verdana" panose="020B0604030504040204" pitchFamily="34" charset="0"/>
-                        </a:rPr>
-                        <a:t>Trazabilidad de</a:t>
+                        <a:t>MTREQM Matriz de Trazabilidad de</a:t>
                       </a:r>
                       <a:r>
                         <a:rPr lang="es-ES" sz="1200" kern="1200" baseline="0" dirty="0" smtClean="0">
@@ -15935,18 +14825,7 @@
                           <a:ea typeface="Verdana" panose="020B0604030504040204" pitchFamily="34" charset="0"/>
                           <a:cs typeface="Verdana" panose="020B0604030504040204" pitchFamily="34" charset="0"/>
                         </a:rPr>
-                        <a:t>ARINT Acta </a:t>
-                      </a:r>
-                      <a:r>
-                        <a:rPr lang="es-ES" sz="1200" kern="1200" dirty="0" smtClean="0">
-                          <a:solidFill>
-                            <a:schemeClr val="dk1"/>
-                          </a:solidFill>
-                          <a:latin typeface="+mj-lt"/>
-                          <a:ea typeface="Verdana" panose="020B0604030504040204" pitchFamily="34" charset="0"/>
-                          <a:cs typeface="Verdana" panose="020B0604030504040204" pitchFamily="34" charset="0"/>
-                        </a:rPr>
-                        <a:t>de Reunión Interna</a:t>
+                        <a:t>ARINT Acta de Reunión Interna</a:t>
                       </a:r>
                     </a:p>
                   </a:txBody>
@@ -19613,7 +18492,7 @@
           <p:nvPr>
             <p:extLst>
               <p:ext uri="{D42A27DB-BD31-4B8C-83A1-F6EECF244321}">
-                <p14:modId xmlns:p14="http://schemas.microsoft.com/office/powerpoint/2010/main" val="2738995936"/>
+                <p14:modId xmlns:p14="http://schemas.microsoft.com/office/powerpoint/2010/main" val="1592212679"/>
               </p:ext>
             </p:extLst>
           </p:nvPr>
@@ -19933,8 +18812,38 @@
                           <a:ea typeface="Verdana" panose="020B0604030504040204" pitchFamily="34" charset="0"/>
                           <a:cs typeface="Verdana" panose="020B0604030504040204" pitchFamily="34" charset="0"/>
                         </a:rPr>
-                        <a:t>Julio Leonardo</a:t>
+                        <a:t>Roger</a:t>
                       </a:r>
+                      <a:r>
+                        <a:rPr lang="es-ES" sz="1200" b="1" kern="1200" baseline="0" dirty="0" smtClean="0">
+                          <a:solidFill>
+                            <a:schemeClr val="dk1"/>
+                          </a:solidFill>
+                          <a:latin typeface="+mj-lt"/>
+                          <a:ea typeface="Verdana" panose="020B0604030504040204" pitchFamily="34" charset="0"/>
+                          <a:cs typeface="Verdana" panose="020B0604030504040204" pitchFamily="34" charset="0"/>
+                        </a:rPr>
+                        <a:t> </a:t>
+                      </a:r>
+                      <a:r>
+                        <a:rPr lang="es-ES" sz="1200" b="1" kern="1200" baseline="0" dirty="0" err="1" smtClean="0">
+                          <a:solidFill>
+                            <a:schemeClr val="dk1"/>
+                          </a:solidFill>
+                          <a:latin typeface="+mj-lt"/>
+                          <a:ea typeface="Verdana" panose="020B0604030504040204" pitchFamily="34" charset="0"/>
+                          <a:cs typeface="Verdana" panose="020B0604030504040204" pitchFamily="34" charset="0"/>
+                        </a:rPr>
+                        <a:t>Apaestegui</a:t>
+                      </a:r>
+                      <a:endParaRPr lang="es-ES" sz="1200" b="1" kern="1200" dirty="0" smtClean="0">
+                        <a:solidFill>
+                          <a:schemeClr val="dk1"/>
+                        </a:solidFill>
+                        <a:latin typeface="+mj-lt"/>
+                        <a:ea typeface="Verdana" panose="020B0604030504040204" pitchFamily="34" charset="0"/>
+                        <a:cs typeface="Verdana" panose="020B0604030504040204" pitchFamily="34" charset="0"/>
+                      </a:endParaRPr>
                     </a:p>
                     <a:p>
                       <a:pPr marL="0" marR="0" lvl="0" indent="0" algn="ctr" defTabSz="457200" rtl="0" eaLnBrk="1" fontAlgn="base" latinLnBrk="0" hangingPunct="1">
@@ -20053,8 +18962,27 @@
                           <a:ea typeface="Verdana" panose="020B0604030504040204" pitchFamily="34" charset="0"/>
                           <a:cs typeface="Verdana" panose="020B0604030504040204" pitchFamily="34" charset="0"/>
                         </a:rPr>
-                        <a:t>Roger Apaestegui Ortega</a:t>
+                        <a:t>Julio Leonardo</a:t>
                       </a:r>
+                      <a:r>
+                        <a:rPr lang="es-ES" sz="1200" b="1" kern="1200" baseline="0" dirty="0" smtClean="0">
+                          <a:solidFill>
+                            <a:schemeClr val="dk1"/>
+                          </a:solidFill>
+                          <a:latin typeface="+mj-lt"/>
+                          <a:ea typeface="Verdana" panose="020B0604030504040204" pitchFamily="34" charset="0"/>
+                          <a:cs typeface="Verdana" panose="020B0604030504040204" pitchFamily="34" charset="0"/>
+                        </a:rPr>
+                        <a:t> Paredes</a:t>
+                      </a:r>
+                      <a:endParaRPr lang="es-ES" sz="1200" b="1" kern="1200" dirty="0" smtClean="0">
+                        <a:solidFill>
+                          <a:schemeClr val="dk1"/>
+                        </a:solidFill>
+                        <a:latin typeface="+mj-lt"/>
+                        <a:ea typeface="Verdana" panose="020B0604030504040204" pitchFamily="34" charset="0"/>
+                        <a:cs typeface="Verdana" panose="020B0604030504040204" pitchFamily="34" charset="0"/>
+                      </a:endParaRPr>
                     </a:p>
                     <a:p>
                       <a:pPr marL="0" marR="0" lvl="0" indent="0" algn="ctr" defTabSz="457200" rtl="0" eaLnBrk="1" fontAlgn="base" latinLnBrk="0" hangingPunct="1">
@@ -20074,7 +19002,7 @@
                         <a:tabLst/>
                       </a:pPr>
                       <a:r>
-                        <a:rPr lang="es-ES" sz="1200" b="1" kern="1200" dirty="0" smtClean="0">
+                        <a:rPr lang="es-ES" sz="1200" b="1" kern="1200" smtClean="0">
                           <a:solidFill>
                             <a:schemeClr val="dk1"/>
                           </a:solidFill>
@@ -20082,8 +19010,16 @@
                           <a:ea typeface="Verdana" panose="020B0604030504040204" pitchFamily="34" charset="0"/>
                           <a:cs typeface="Verdana" panose="020B0604030504040204" pitchFamily="34" charset="0"/>
                         </a:rPr>
-                        <a:t>(Jefe de Proyecto)</a:t>
+                        <a:t>(Analista de Calidad)</a:t>
                       </a:r>
+                      <a:endParaRPr lang="es-ES" sz="1200" b="1" kern="1200" dirty="0" smtClean="0">
+                        <a:solidFill>
+                          <a:schemeClr val="dk1"/>
+                        </a:solidFill>
+                        <a:latin typeface="+mj-lt"/>
+                        <a:ea typeface="Verdana" panose="020B0604030504040204" pitchFamily="34" charset="0"/>
+                        <a:cs typeface="Verdana" panose="020B0604030504040204" pitchFamily="34" charset="0"/>
+                      </a:endParaRPr>
                     </a:p>
                   </a:txBody>
                   <a:tcPr marT="45702" marB="45702" anchor="ctr" horzOverflow="overflow"/>

</xml_diff>